<commit_message>
Change to the gitignore file
</commit_message>
<xml_diff>
--- a/slides/day4Collections and Algorithms - recap.pptx
+++ b/slides/day4Collections and Algorithms - recap.pptx
@@ -5,16 +5,22 @@
     <p:sldMasterId id="2147483648" r:id="rId1"/>
   </p:sldMasterIdLst>
   <p:notesMasterIdLst>
-    <p:notesMasterId r:id="rId6"/>
+    <p:notesMasterId r:id="rId12"/>
   </p:notesMasterIdLst>
   <p:handoutMasterIdLst>
-    <p:handoutMasterId r:id="rId7"/>
+    <p:handoutMasterId r:id="rId13"/>
   </p:handoutMasterIdLst>
   <p:sldIdLst>
-    <p:sldId id="256" r:id="rId2"/>
-    <p:sldId id="257" r:id="rId3"/>
-    <p:sldId id="258" r:id="rId4"/>
-    <p:sldId id="259" r:id="rId5"/>
+    <p:sldId id="260" r:id="rId2"/>
+    <p:sldId id="261" r:id="rId3"/>
+    <p:sldId id="262" r:id="rId4"/>
+    <p:sldId id="263" r:id="rId5"/>
+    <p:sldId id="264" r:id="rId6"/>
+    <p:sldId id="256" r:id="rId7"/>
+    <p:sldId id="257" r:id="rId8"/>
+    <p:sldId id="258" r:id="rId9"/>
+    <p:sldId id="259" r:id="rId10"/>
+    <p:sldId id="265" r:id="rId11"/>
   </p:sldIdLst>
   <p:sldSz cx="9144000" cy="6858000" type="screen4x3"/>
   <p:notesSz cx="6858000" cy="9144000"/>
@@ -113,6 +119,22 @@
       </a:defRPr>
     </a:lvl9pPr>
   </p:defaultTextStyle>
+  <p:extLst>
+    <p:ext uri="{EFAFB233-063F-42B5-8137-9DF3F51BA10A}">
+      <p15:sldGuideLst xmlns:p15="http://schemas.microsoft.com/office/powerpoint/2012/main">
+        <p15:guide id="1" orient="horz" pos="2160">
+          <p15:clr>
+            <a:srgbClr val="A4A3A4"/>
+          </p15:clr>
+        </p15:guide>
+        <p15:guide id="2" pos="2880">
+          <p15:clr>
+            <a:srgbClr val="A4A3A4"/>
+          </p15:clr>
+        </p15:guide>
+      </p15:sldGuideLst>
+    </p:ext>
+  </p:extLst>
 </p:presentation>
 </file>
 
@@ -202,7 +224,7 @@
           <a:p>
             <a:fld id="{C0EC10C0-600E-4DA5-8247-AC1565CE5E13}" type="datetimeFigureOut">
               <a:rPr lang="da-DK" smtClean="0"/>
-              <a:t>24-02-2015</a:t>
+              <a:t>21/09/2016</a:t>
             </a:fld>
             <a:endParaRPr lang="da-DK"/>
           </a:p>
@@ -376,7 +398,7 @@
           <a:p>
             <a:fld id="{C2AD640C-A414-497E-8271-5693E49582A0}" type="datetimeFigureOut">
               <a:rPr lang="da-DK" smtClean="0"/>
-              <a:t>24-02-2015</a:t>
+              <a:t>21/09/2016</a:t>
             </a:fld>
             <a:endParaRPr lang="da-DK"/>
           </a:p>
@@ -693,6 +715,148 @@
           <a:bodyPr/>
           <a:lstStyle/>
           <a:p>
+            <a:endParaRPr lang="da-DK" dirty="0"/>
+          </a:p>
+        </p:txBody>
+      </p:sp>
+      <p:sp>
+        <p:nvSpPr>
+          <p:cNvPr id="4" name="Date Placeholder 3"/>
+          <p:cNvSpPr>
+            <a:spLocks noGrp="1"/>
+          </p:cNvSpPr>
+          <p:nvPr>
+            <p:ph type="dt" idx="10"/>
+          </p:nvPr>
+        </p:nvSpPr>
+        <p:spPr/>
+        <p:txBody>
+          <a:bodyPr/>
+          <a:lstStyle/>
+          <a:p>
+            <a:pPr>
+              <a:defRPr/>
+            </a:pPr>
+            <a:r>
+              <a:rPr lang="da-DK" smtClean="0"/>
+              <a:t>2014 - hau</a:t>
+            </a:r>
+            <a:endParaRPr lang="da-DK"/>
+          </a:p>
+        </p:txBody>
+      </p:sp>
+      <p:sp>
+        <p:nvSpPr>
+          <p:cNvPr id="5" name="Footer Placeholder 4"/>
+          <p:cNvSpPr>
+            <a:spLocks noGrp="1"/>
+          </p:cNvSpPr>
+          <p:nvPr>
+            <p:ph type="ftr" sz="quarter" idx="11"/>
+          </p:nvPr>
+        </p:nvSpPr>
+        <p:spPr/>
+        <p:txBody>
+          <a:bodyPr/>
+          <a:lstStyle/>
+          <a:p>
+            <a:pPr>
+              <a:defRPr/>
+            </a:pPr>
+            <a:r>
+              <a:rPr lang="da-DK" smtClean="0"/>
+              <a:t>Collections and efficiency</a:t>
+            </a:r>
+            <a:endParaRPr lang="da-DK"/>
+          </a:p>
+        </p:txBody>
+      </p:sp>
+      <p:sp>
+        <p:nvSpPr>
+          <p:cNvPr id="6" name="Slide Number Placeholder 5"/>
+          <p:cNvSpPr>
+            <a:spLocks noGrp="1"/>
+          </p:cNvSpPr>
+          <p:nvPr>
+            <p:ph type="sldNum" sz="quarter" idx="12"/>
+          </p:nvPr>
+        </p:nvSpPr>
+        <p:spPr/>
+        <p:txBody>
+          <a:bodyPr/>
+          <a:lstStyle/>
+          <a:p>
+            <a:pPr>
+              <a:defRPr/>
+            </a:pPr>
+            <a:fld id="{FBF00D1E-FF9A-47D7-BC98-4C90EE7BAB5C}" type="slidenum">
+              <a:rPr lang="da-DK" smtClean="0"/>
+              <a:pPr>
+                <a:defRPr/>
+              </a:pPr>
+              <a:t>5</a:t>
+            </a:fld>
+            <a:endParaRPr lang="da-DK"/>
+          </a:p>
+        </p:txBody>
+      </p:sp>
+    </p:spTree>
+    <p:extLst>
+      <p:ext uri="{BB962C8B-B14F-4D97-AF65-F5344CB8AC3E}">
+        <p14:creationId xmlns:p14="http://schemas.microsoft.com/office/powerpoint/2010/main" val="1477941423"/>
+      </p:ext>
+    </p:extLst>
+  </p:cSld>
+  <p:clrMapOvr>
+    <a:masterClrMapping/>
+  </p:clrMapOvr>
+</p:notes>
+</file>
+
+<file path=ppt/notesSlides/notesSlide2.xml><?xml version="1.0" encoding="utf-8"?>
+<p:notes xmlns:a="http://schemas.openxmlformats.org/drawingml/2006/main" xmlns:r="http://schemas.openxmlformats.org/officeDocument/2006/relationships" xmlns:p="http://schemas.openxmlformats.org/presentationml/2006/main">
+  <p:cSld>
+    <p:spTree>
+      <p:nvGrpSpPr>
+        <p:cNvPr id="1" name=""/>
+        <p:cNvGrpSpPr/>
+        <p:nvPr/>
+      </p:nvGrpSpPr>
+      <p:grpSpPr>
+        <a:xfrm>
+          <a:off x="0" y="0"/>
+          <a:ext cx="0" cy="0"/>
+          <a:chOff x="0" y="0"/>
+          <a:chExt cx="0" cy="0"/>
+        </a:xfrm>
+      </p:grpSpPr>
+      <p:sp>
+        <p:nvSpPr>
+          <p:cNvPr id="2" name="Slide Image Placeholder 1"/>
+          <p:cNvSpPr>
+            <a:spLocks noGrp="1" noRot="1" noChangeAspect="1"/>
+          </p:cNvSpPr>
+          <p:nvPr>
+            <p:ph type="sldImg"/>
+          </p:nvPr>
+        </p:nvSpPr>
+        <p:spPr/>
+      </p:sp>
+      <p:sp>
+        <p:nvSpPr>
+          <p:cNvPr id="3" name="Notes Placeholder 2"/>
+          <p:cNvSpPr>
+            <a:spLocks noGrp="1"/>
+          </p:cNvSpPr>
+          <p:nvPr>
+            <p:ph type="body" idx="1"/>
+          </p:nvPr>
+        </p:nvSpPr>
+        <p:spPr/>
+        <p:txBody>
+          <a:bodyPr/>
+          <a:lstStyle/>
+          <a:p>
             <a:endParaRPr lang="da-DK"/>
           </a:p>
         </p:txBody>
@@ -714,7 +878,7 @@
           <a:p>
             <a:fld id="{067D2DBF-4C11-4BAC-8544-9A62A0CDDF14}" type="slidenum">
               <a:rPr lang="da-DK" smtClean="0"/>
-              <a:t>1</a:t>
+              <a:t>6</a:t>
             </a:fld>
             <a:endParaRPr lang="da-DK"/>
           </a:p>
@@ -770,6 +934,246 @@
     <p:extLst>
       <p:ext uri="{BB962C8B-B14F-4D97-AF65-F5344CB8AC3E}">
         <p14:creationId xmlns:p14="http://schemas.microsoft.com/office/powerpoint/2010/main" val="3310974848"/>
+      </p:ext>
+    </p:extLst>
+  </p:cSld>
+  <p:clrMapOvr>
+    <a:masterClrMapping/>
+  </p:clrMapOvr>
+</p:notes>
+</file>
+
+<file path=ppt/notesSlides/notesSlide3.xml><?xml version="1.0" encoding="utf-8"?>
+<p:notes xmlns:a="http://schemas.openxmlformats.org/drawingml/2006/main" xmlns:r="http://schemas.openxmlformats.org/officeDocument/2006/relationships" xmlns:p="http://schemas.openxmlformats.org/presentationml/2006/main">
+  <p:cSld>
+    <p:spTree>
+      <p:nvGrpSpPr>
+        <p:cNvPr id="1" name=""/>
+        <p:cNvGrpSpPr/>
+        <p:nvPr/>
+      </p:nvGrpSpPr>
+      <p:grpSpPr>
+        <a:xfrm>
+          <a:off x="0" y="0"/>
+          <a:ext cx="0" cy="0"/>
+          <a:chOff x="0" y="0"/>
+          <a:chExt cx="0" cy="0"/>
+        </a:xfrm>
+      </p:grpSpPr>
+      <p:sp>
+        <p:nvSpPr>
+          <p:cNvPr id="37889" name="Pladsholder til diasbillede 1"/>
+          <p:cNvSpPr>
+            <a:spLocks noGrp="1" noRot="1" noChangeAspect="1"/>
+          </p:cNvSpPr>
+          <p:nvPr>
+            <p:ph type="sldImg"/>
+          </p:nvPr>
+        </p:nvSpPr>
+        <p:spPr bwMode="auto">
+          <a:noFill/>
+          <a:ln>
+            <a:solidFill>
+              <a:srgbClr val="000000"/>
+            </a:solidFill>
+            <a:miter lim="800000"/>
+            <a:headEnd/>
+            <a:tailEnd/>
+          </a:ln>
+        </p:spPr>
+      </p:sp>
+      <p:sp>
+        <p:nvSpPr>
+          <p:cNvPr id="37890" name="Pladsholder til noter 2"/>
+          <p:cNvSpPr>
+            <a:spLocks noGrp="1"/>
+          </p:cNvSpPr>
+          <p:nvPr>
+            <p:ph type="body" idx="1"/>
+          </p:nvPr>
+        </p:nvSpPr>
+        <p:spPr bwMode="auto">
+          <a:noFill/>
+        </p:spPr>
+        <p:txBody>
+          <a:bodyPr wrap="square" numCol="1" anchor="t" anchorCtr="0" compatLnSpc="1">
+            <a:prstTxWarp prst="textNoShape">
+              <a:avLst/>
+            </a:prstTxWarp>
+          </a:bodyPr>
+          <a:lstStyle/>
+          <a:p>
+            <a:pPr>
+              <a:spcBef>
+                <a:spcPct val="0"/>
+              </a:spcBef>
+            </a:pPr>
+            <a:r>
+              <a:rPr lang="da-DK" dirty="0" smtClean="0"/>
+              <a:t>1: array </a:t>
+            </a:r>
+          </a:p>
+          <a:p>
+            <a:pPr>
+              <a:spcBef>
+                <a:spcPct val="0"/>
+              </a:spcBef>
+            </a:pPr>
+            <a:r>
+              <a:rPr lang="da-DK" dirty="0" smtClean="0"/>
+              <a:t>2: </a:t>
+            </a:r>
+            <a:r>
+              <a:rPr lang="da-DK" dirty="0" err="1" smtClean="0"/>
+              <a:t>linked</a:t>
+            </a:r>
+            <a:endParaRPr lang="da-DK" dirty="0" smtClean="0"/>
+          </a:p>
+          <a:p>
+            <a:pPr>
+              <a:spcBef>
+                <a:spcPct val="0"/>
+              </a:spcBef>
+            </a:pPr>
+            <a:r>
+              <a:rPr lang="da-DK" dirty="0" smtClean="0"/>
+              <a:t>3: hash</a:t>
+            </a:r>
+          </a:p>
+          <a:p>
+            <a:pPr>
+              <a:spcBef>
+                <a:spcPct val="0"/>
+              </a:spcBef>
+            </a:pPr>
+            <a:r>
+              <a:rPr lang="da-DK" dirty="0" smtClean="0"/>
+              <a:t>4. Array eller </a:t>
+            </a:r>
+            <a:r>
+              <a:rPr lang="da-DK" dirty="0" err="1" smtClean="0"/>
+              <a:t>linked</a:t>
+            </a:r>
+            <a:endParaRPr lang="da-DK" dirty="0" smtClean="0"/>
+          </a:p>
+          <a:p>
+            <a:pPr>
+              <a:spcBef>
+                <a:spcPct val="0"/>
+              </a:spcBef>
+            </a:pPr>
+            <a:r>
+              <a:rPr lang="da-DK" dirty="0" smtClean="0"/>
+              <a:t>5.</a:t>
+            </a:r>
+            <a:r>
+              <a:rPr lang="da-DK" baseline="0" dirty="0" smtClean="0"/>
+              <a:t> Binært søgetræ</a:t>
+            </a:r>
+            <a:endParaRPr lang="da-DK" dirty="0" smtClean="0"/>
+          </a:p>
+        </p:txBody>
+      </p:sp>
+      <p:sp>
+        <p:nvSpPr>
+          <p:cNvPr id="37891" name="Pladsholder til diasnummer 3"/>
+          <p:cNvSpPr>
+            <a:spLocks noGrp="1"/>
+          </p:cNvSpPr>
+          <p:nvPr>
+            <p:ph type="sldNum" sz="quarter" idx="5"/>
+          </p:nvPr>
+        </p:nvSpPr>
+        <p:spPr bwMode="auto">
+          <a:noFill/>
+          <a:ln>
+            <a:miter lim="800000"/>
+            <a:headEnd/>
+            <a:tailEnd/>
+          </a:ln>
+        </p:spPr>
+        <p:txBody>
+          <a:bodyPr wrap="square" numCol="1" anchorCtr="0" compatLnSpc="1">
+            <a:prstTxWarp prst="textNoShape">
+              <a:avLst/>
+            </a:prstTxWarp>
+          </a:bodyPr>
+          <a:lstStyle/>
+          <a:p>
+            <a:pPr fontAlgn="base">
+              <a:spcBef>
+                <a:spcPct val="0"/>
+              </a:spcBef>
+              <a:spcAft>
+                <a:spcPct val="0"/>
+              </a:spcAft>
+            </a:pPr>
+            <a:fld id="{B44657B6-4BFB-44B0-A1C0-F6C0AB618C9E}" type="slidenum">
+              <a:rPr lang="da-DK"/>
+              <a:pPr fontAlgn="base">
+                <a:spcBef>
+                  <a:spcPct val="0"/>
+                </a:spcBef>
+                <a:spcAft>
+                  <a:spcPct val="0"/>
+                </a:spcAft>
+              </a:pPr>
+              <a:t>10</a:t>
+            </a:fld>
+            <a:endParaRPr lang="da-DK"/>
+          </a:p>
+        </p:txBody>
+      </p:sp>
+      <p:sp>
+        <p:nvSpPr>
+          <p:cNvPr id="2" name="Date Placeholder 1"/>
+          <p:cNvSpPr>
+            <a:spLocks noGrp="1"/>
+          </p:cNvSpPr>
+          <p:nvPr>
+            <p:ph type="dt" idx="10"/>
+          </p:nvPr>
+        </p:nvSpPr>
+        <p:spPr/>
+        <p:txBody>
+          <a:bodyPr/>
+          <a:lstStyle/>
+          <a:p>
+            <a:r>
+              <a:rPr lang="da-DK" smtClean="0"/>
+              <a:t>hau</a:t>
+            </a:r>
+            <a:endParaRPr lang="da-DK"/>
+          </a:p>
+        </p:txBody>
+      </p:sp>
+      <p:sp>
+        <p:nvSpPr>
+          <p:cNvPr id="3" name="Footer Placeholder 2"/>
+          <p:cNvSpPr>
+            <a:spLocks noGrp="1"/>
+          </p:cNvSpPr>
+          <p:nvPr>
+            <p:ph type="ftr" sz="quarter" idx="11"/>
+          </p:nvPr>
+        </p:nvSpPr>
+        <p:spPr/>
+        <p:txBody>
+          <a:bodyPr/>
+          <a:lstStyle/>
+          <a:p>
+            <a:r>
+              <a:rPr lang="da-DK" smtClean="0"/>
+              <a:t>Recursion and Binary Trees</a:t>
+            </a:r>
+            <a:endParaRPr lang="da-DK"/>
+          </a:p>
+        </p:txBody>
+      </p:sp>
+    </p:spTree>
+    <p:extLst>
+      <p:ext uri="{BB962C8B-B14F-4D97-AF65-F5344CB8AC3E}">
+        <p14:creationId xmlns:p14="http://schemas.microsoft.com/office/powerpoint/2010/main" val="817227813"/>
       </p:ext>
     </p:extLst>
   </p:cSld>
@@ -3758,6 +4162,4030 @@
       </p:grpSpPr>
       <p:sp>
         <p:nvSpPr>
+          <p:cNvPr id="2" name="Titel 1"/>
+          <p:cNvSpPr>
+            <a:spLocks noGrp="1"/>
+          </p:cNvSpPr>
+          <p:nvPr>
+            <p:ph type="title"/>
+          </p:nvPr>
+        </p:nvSpPr>
+        <p:spPr>
+          <a:xfrm>
+            <a:off x="322259" y="261531"/>
+            <a:ext cx="8226533" cy="1142574"/>
+          </a:xfrm>
+        </p:spPr>
+        <p:txBody>
+          <a:bodyPr rtlCol="0">
+            <a:normAutofit/>
+          </a:bodyPr>
+          <a:lstStyle/>
+          <a:p>
+            <a:pPr>
+              <a:defRPr/>
+            </a:pPr>
+            <a:r>
+              <a:rPr lang="da-DK" dirty="0" smtClean="0">
+                <a:latin typeface="Arial Rounded MT Bold" pitchFamily="34" charset="0"/>
+              </a:rPr>
+              <a:t>Hash </a:t>
+            </a:r>
+            <a:r>
+              <a:rPr lang="da-DK" dirty="0" err="1" smtClean="0">
+                <a:latin typeface="Arial Rounded MT Bold" pitchFamily="34" charset="0"/>
+              </a:rPr>
+              <a:t>table</a:t>
+            </a:r>
+            <a:endParaRPr lang="da-DK" dirty="0">
+              <a:latin typeface="Arial Rounded MT Bold" pitchFamily="34" charset="0"/>
+            </a:endParaRPr>
+          </a:p>
+        </p:txBody>
+      </p:sp>
+      <p:pic>
+        <p:nvPicPr>
+          <p:cNvPr id="32771" name="Picture 5"/>
+          <p:cNvPicPr>
+            <a:picLocks noChangeAspect="1" noChangeArrowheads="1"/>
+          </p:cNvPicPr>
+          <p:nvPr/>
+        </p:nvPicPr>
+        <p:blipFill>
+          <a:blip r:embed="rId2"/>
+          <a:srcRect/>
+          <a:stretch>
+            <a:fillRect/>
+          </a:stretch>
+        </p:blipFill>
+        <p:spPr bwMode="auto">
+          <a:xfrm>
+            <a:off x="1274405" y="1629447"/>
+            <a:ext cx="6320657" cy="4535384"/>
+          </a:xfrm>
+          <a:prstGeom prst="rect">
+            <a:avLst/>
+          </a:prstGeom>
+          <a:noFill/>
+          <a:ln w="9525">
+            <a:noFill/>
+            <a:miter lim="800000"/>
+            <a:headEnd/>
+            <a:tailEnd/>
+          </a:ln>
+        </p:spPr>
+      </p:pic>
+    </p:spTree>
+    <p:extLst>
+      <p:ext uri="{BB962C8B-B14F-4D97-AF65-F5344CB8AC3E}">
+        <p14:creationId xmlns:p14="http://schemas.microsoft.com/office/powerpoint/2010/main" val="421480594"/>
+      </p:ext>
+    </p:extLst>
+  </p:cSld>
+  <p:clrMapOvr>
+    <a:masterClrMapping/>
+  </p:clrMapOvr>
+  <p:timing>
+    <p:tnLst>
+      <p:par>
+        <p:cTn id="1" dur="indefinite" restart="never" nodeType="tmRoot"/>
+      </p:par>
+    </p:tnLst>
+  </p:timing>
+</p:sld>
+</file>
+
+<file path=ppt/slides/slide10.xml><?xml version="1.0" encoding="utf-8"?>
+<p:sld xmlns:a="http://schemas.openxmlformats.org/drawingml/2006/main" xmlns:r="http://schemas.openxmlformats.org/officeDocument/2006/relationships" xmlns:p="http://schemas.openxmlformats.org/presentationml/2006/main">
+  <p:cSld>
+    <p:spTree>
+      <p:nvGrpSpPr>
+        <p:cNvPr id="1" name=""/>
+        <p:cNvGrpSpPr/>
+        <p:nvPr/>
+      </p:nvGrpSpPr>
+      <p:grpSpPr>
+        <a:xfrm>
+          <a:off x="0" y="0"/>
+          <a:ext cx="0" cy="0"/>
+          <a:chOff x="0" y="0"/>
+          <a:chExt cx="0" cy="0"/>
+        </a:xfrm>
+      </p:grpSpPr>
+      <p:sp>
+        <p:nvSpPr>
+          <p:cNvPr id="65538" name="Rectangle 2"/>
+          <p:cNvSpPr>
+            <a:spLocks noGrp="1" noChangeArrowheads="1"/>
+          </p:cNvSpPr>
+          <p:nvPr>
+            <p:ph type="title"/>
+          </p:nvPr>
+        </p:nvSpPr>
+        <p:spPr>
+          <a:xfrm>
+            <a:off x="457200" y="188913"/>
+            <a:ext cx="8435280" cy="1228725"/>
+          </a:xfrm>
+        </p:spPr>
+        <p:txBody>
+          <a:bodyPr rtlCol="0">
+            <a:normAutofit/>
+          </a:bodyPr>
+          <a:lstStyle/>
+          <a:p>
+            <a:pPr algn="l" fontAlgn="auto">
+              <a:spcAft>
+                <a:spcPts val="0"/>
+              </a:spcAft>
+              <a:defRPr/>
+            </a:pPr>
+            <a:r>
+              <a:rPr lang="da-DK" sz="3200" dirty="0" err="1" smtClean="0"/>
+              <a:t>Efficiency</a:t>
+            </a:r>
+            <a:r>
+              <a:rPr lang="da-DK" sz="3200" dirty="0" smtClean="0"/>
+              <a:t> of </a:t>
+            </a:r>
+            <a:r>
+              <a:rPr lang="da-DK" sz="3200" dirty="0" smtClean="0"/>
+              <a:t>data </a:t>
+            </a:r>
+            <a:r>
+              <a:rPr lang="da-DK" sz="3200" dirty="0" err="1" smtClean="0"/>
+              <a:t>structure</a:t>
+            </a:r>
+            <a:endParaRPr lang="da-DK" sz="2800" dirty="0"/>
+          </a:p>
+        </p:txBody>
+      </p:sp>
+      <p:sp>
+        <p:nvSpPr>
+          <p:cNvPr id="36866" name="Rectangle 3"/>
+          <p:cNvSpPr>
+            <a:spLocks noGrp="1" noChangeArrowheads="1"/>
+          </p:cNvSpPr>
+          <p:nvPr>
+            <p:ph type="body" idx="1"/>
+          </p:nvPr>
+        </p:nvSpPr>
+        <p:spPr/>
+        <p:txBody>
+          <a:bodyPr/>
+          <a:lstStyle/>
+          <a:p>
+            <a:endParaRPr lang="da-DK" dirty="0" smtClean="0"/>
+          </a:p>
+          <a:p>
+            <a:endParaRPr lang="da-DK" dirty="0" smtClean="0"/>
+          </a:p>
+        </p:txBody>
+      </p:sp>
+      <p:graphicFrame>
+        <p:nvGraphicFramePr>
+          <p:cNvPr id="2" name="Tabel 1"/>
+          <p:cNvGraphicFramePr>
+            <a:graphicFrameLocks noGrp="1"/>
+          </p:cNvGraphicFramePr>
+          <p:nvPr>
+            <p:extLst>
+              <p:ext uri="{D42A27DB-BD31-4B8C-83A1-F6EECF244321}">
+                <p14:modId xmlns:p14="http://schemas.microsoft.com/office/powerpoint/2010/main" val="1067997243"/>
+              </p:ext>
+            </p:extLst>
+          </p:nvPr>
+        </p:nvGraphicFramePr>
+        <p:xfrm>
+          <a:off x="611558" y="1628800"/>
+          <a:ext cx="8208913" cy="4867434"/>
+        </p:xfrm>
+        <a:graphic>
+          <a:graphicData uri="http://schemas.openxmlformats.org/drawingml/2006/table">
+            <a:tbl>
+              <a:tblPr firstRow="1" bandRow="1">
+                <a:tableStyleId>{5940675A-B579-460E-94D1-54222C63F5DA}</a:tableStyleId>
+              </a:tblPr>
+              <a:tblGrid>
+                <a:gridCol w="1677089"/>
+                <a:gridCol w="1412286"/>
+                <a:gridCol w="1235750"/>
+                <a:gridCol w="1235750"/>
+                <a:gridCol w="1162617"/>
+                <a:gridCol w="1485421"/>
+              </a:tblGrid>
+              <a:tr h="708078">
+                <a:tc>
+                  <a:txBody>
+                    <a:bodyPr/>
+                    <a:lstStyle/>
+                    <a:p>
+                      <a:endParaRPr lang="da-DK" dirty="0"/>
+                    </a:p>
+                  </a:txBody>
+                  <a:tcPr>
+                    <a:lnR w="38100" cap="flat" cmpd="sng" algn="ctr">
+                      <a:solidFill>
+                        <a:schemeClr val="tx1"/>
+                      </a:solidFill>
+                      <a:prstDash val="solid"/>
+                      <a:round/>
+                      <a:headEnd type="none" w="med" len="med"/>
+                      <a:tailEnd type="none" w="med" len="med"/>
+                    </a:lnR>
+                  </a:tcPr>
+                </a:tc>
+                <a:tc>
+                  <a:txBody>
+                    <a:bodyPr/>
+                    <a:lstStyle/>
+                    <a:p>
+                      <a:r>
+                        <a:rPr lang="da-DK" dirty="0" smtClean="0"/>
+                        <a:t>array</a:t>
+                      </a:r>
+                    </a:p>
+                    <a:p>
+                      <a:r>
+                        <a:rPr lang="da-DK" dirty="0" smtClean="0"/>
+                        <a:t>Eg. </a:t>
+                      </a:r>
+                      <a:r>
+                        <a:rPr lang="da-DK" dirty="0" err="1" smtClean="0"/>
+                        <a:t>int</a:t>
+                      </a:r>
+                      <a:r>
+                        <a:rPr lang="da-DK" dirty="0" smtClean="0"/>
+                        <a:t>[]</a:t>
+                      </a:r>
+                      <a:endParaRPr lang="da-DK" dirty="0"/>
+                    </a:p>
+                  </a:txBody>
+                  <a:tcPr>
+                    <a:lnL w="38100" cap="flat" cmpd="sng" algn="ctr">
+                      <a:solidFill>
+                        <a:schemeClr val="tx1"/>
+                      </a:solidFill>
+                      <a:prstDash val="solid"/>
+                      <a:round/>
+                      <a:headEnd type="none" w="med" len="med"/>
+                      <a:tailEnd type="none" w="med" len="med"/>
+                    </a:lnL>
+                  </a:tcPr>
+                </a:tc>
+                <a:tc>
+                  <a:txBody>
+                    <a:bodyPr/>
+                    <a:lstStyle/>
+                    <a:p>
+                      <a:r>
+                        <a:rPr lang="da-DK" dirty="0" err="1" smtClean="0"/>
+                        <a:t>ArrayList</a:t>
+                      </a:r>
+                      <a:endParaRPr lang="da-DK" dirty="0"/>
+                    </a:p>
+                  </a:txBody>
+                  <a:tcPr/>
+                </a:tc>
+                <a:tc>
+                  <a:txBody>
+                    <a:bodyPr/>
+                    <a:lstStyle/>
+                    <a:p>
+                      <a:r>
+                        <a:rPr lang="da-DK" dirty="0" err="1" smtClean="0"/>
+                        <a:t>Linked</a:t>
+                      </a:r>
+                      <a:endParaRPr lang="da-DK" dirty="0" smtClean="0"/>
+                    </a:p>
+                    <a:p>
+                      <a:r>
+                        <a:rPr lang="da-DK" dirty="0" smtClean="0"/>
+                        <a:t>list</a:t>
+                      </a:r>
+                    </a:p>
+                    <a:p>
+                      <a:endParaRPr lang="da-DK" dirty="0"/>
+                    </a:p>
+                  </a:txBody>
+                  <a:tcPr/>
+                </a:tc>
+                <a:tc>
+                  <a:txBody>
+                    <a:bodyPr/>
+                    <a:lstStyle/>
+                    <a:p>
+                      <a:r>
+                        <a:rPr lang="da-DK" dirty="0" smtClean="0"/>
+                        <a:t>Hash</a:t>
+                      </a:r>
+                    </a:p>
+                    <a:p>
+                      <a:r>
+                        <a:rPr lang="da-DK" dirty="0" err="1" smtClean="0"/>
+                        <a:t>map</a:t>
+                      </a:r>
+                      <a:endParaRPr lang="da-DK" dirty="0"/>
+                    </a:p>
+                  </a:txBody>
+                  <a:tcPr/>
+                </a:tc>
+                <a:tc>
+                  <a:txBody>
+                    <a:bodyPr/>
+                    <a:lstStyle/>
+                    <a:p>
+                      <a:r>
+                        <a:rPr lang="da-DK" b="1" dirty="0" smtClean="0"/>
+                        <a:t>BST</a:t>
+                      </a:r>
+                    </a:p>
+                    <a:p>
+                      <a:r>
+                        <a:rPr lang="da-DK" b="1" dirty="0" smtClean="0"/>
+                        <a:t>(</a:t>
+                      </a:r>
+                      <a:r>
+                        <a:rPr lang="da-DK" b="1" dirty="0" err="1" smtClean="0"/>
+                        <a:t>Binary</a:t>
+                      </a:r>
+                      <a:r>
+                        <a:rPr lang="da-DK" b="1" baseline="0" dirty="0" smtClean="0"/>
+                        <a:t> </a:t>
+                      </a:r>
+                      <a:r>
+                        <a:rPr lang="da-DK" b="1" dirty="0" err="1" smtClean="0"/>
+                        <a:t>search</a:t>
+                      </a:r>
+                      <a:r>
+                        <a:rPr lang="da-DK" b="1" baseline="0" dirty="0" smtClean="0"/>
+                        <a:t> </a:t>
+                      </a:r>
+                      <a:r>
+                        <a:rPr lang="da-DK" b="1" baseline="0" dirty="0" err="1" smtClean="0"/>
+                        <a:t>tree</a:t>
+                      </a:r>
+                      <a:endParaRPr lang="da-DK" b="1" dirty="0"/>
+                    </a:p>
+                  </a:txBody>
+                  <a:tcPr/>
+                </a:tc>
+              </a:tr>
+              <a:tr h="708078">
+                <a:tc>
+                  <a:txBody>
+                    <a:bodyPr/>
+                    <a:lstStyle/>
+                    <a:p>
+                      <a:r>
+                        <a:rPr lang="da-DK" dirty="0" err="1" smtClean="0"/>
+                        <a:t>insert</a:t>
+                      </a:r>
+                      <a:r>
+                        <a:rPr lang="da-DK" dirty="0" smtClean="0"/>
+                        <a:t> </a:t>
+                      </a:r>
+                      <a:r>
+                        <a:rPr lang="da-DK" dirty="0" err="1" smtClean="0"/>
+                        <a:t>first</a:t>
+                      </a:r>
+                      <a:endParaRPr lang="da-DK" dirty="0" smtClean="0"/>
+                    </a:p>
+                    <a:p>
+                      <a:r>
+                        <a:rPr lang="da-DK" dirty="0" err="1" smtClean="0"/>
+                        <a:t>insert</a:t>
+                      </a:r>
+                      <a:r>
+                        <a:rPr lang="da-DK" baseline="0" dirty="0" smtClean="0"/>
+                        <a:t> last</a:t>
+                      </a:r>
+                    </a:p>
+                    <a:p>
+                      <a:r>
+                        <a:rPr lang="da-DK" baseline="0" dirty="0" err="1" smtClean="0"/>
+                        <a:t>insert</a:t>
+                      </a:r>
+                      <a:r>
+                        <a:rPr lang="da-DK" baseline="0" dirty="0" smtClean="0"/>
+                        <a:t> </a:t>
+                      </a:r>
+                      <a:r>
+                        <a:rPr lang="da-DK" baseline="0" dirty="0" err="1" smtClean="0"/>
+                        <a:t>middle</a:t>
+                      </a:r>
+                      <a:endParaRPr lang="da-DK" dirty="0"/>
+                    </a:p>
+                  </a:txBody>
+                  <a:tcPr>
+                    <a:lnR w="38100" cap="flat" cmpd="sng" algn="ctr">
+                      <a:solidFill>
+                        <a:schemeClr val="tx1"/>
+                      </a:solidFill>
+                      <a:prstDash val="solid"/>
+                      <a:round/>
+                      <a:headEnd type="none" w="med" len="med"/>
+                      <a:tailEnd type="none" w="med" len="med"/>
+                    </a:lnR>
+                  </a:tcPr>
+                </a:tc>
+                <a:tc>
+                  <a:txBody>
+                    <a:bodyPr/>
+                    <a:lstStyle/>
+                    <a:p>
+                      <a:endParaRPr lang="da-DK" dirty="0"/>
+                    </a:p>
+                  </a:txBody>
+                  <a:tcPr>
+                    <a:lnL w="38100" cap="flat" cmpd="sng" algn="ctr">
+                      <a:solidFill>
+                        <a:schemeClr val="tx1"/>
+                      </a:solidFill>
+                      <a:prstDash val="solid"/>
+                      <a:round/>
+                      <a:headEnd type="none" w="med" len="med"/>
+                      <a:tailEnd type="none" w="med" len="med"/>
+                    </a:lnL>
+                  </a:tcPr>
+                </a:tc>
+                <a:tc>
+                  <a:txBody>
+                    <a:bodyPr/>
+                    <a:lstStyle/>
+                    <a:p>
+                      <a:endParaRPr lang="da-DK" dirty="0"/>
+                    </a:p>
+                  </a:txBody>
+                  <a:tcPr/>
+                </a:tc>
+                <a:tc>
+                  <a:txBody>
+                    <a:bodyPr/>
+                    <a:lstStyle/>
+                    <a:p>
+                      <a:endParaRPr lang="da-DK" dirty="0"/>
+                    </a:p>
+                  </a:txBody>
+                  <a:tcPr/>
+                </a:tc>
+                <a:tc>
+                  <a:txBody>
+                    <a:bodyPr/>
+                    <a:lstStyle/>
+                    <a:p>
+                      <a:endParaRPr lang="da-DK" dirty="0"/>
+                    </a:p>
+                  </a:txBody>
+                  <a:tcPr/>
+                </a:tc>
+                <a:tc>
+                  <a:txBody>
+                    <a:bodyPr/>
+                    <a:lstStyle/>
+                    <a:p>
+                      <a:endParaRPr lang="da-DK" b="1" dirty="0"/>
+                    </a:p>
+                  </a:txBody>
+                  <a:tcPr/>
+                </a:tc>
+              </a:tr>
+              <a:tr h="708078">
+                <a:tc>
+                  <a:txBody>
+                    <a:bodyPr/>
+                    <a:lstStyle/>
+                    <a:p>
+                      <a:r>
+                        <a:rPr lang="da-DK" dirty="0" err="1" smtClean="0"/>
+                        <a:t>erase</a:t>
+                      </a:r>
+                      <a:r>
+                        <a:rPr lang="da-DK" dirty="0" smtClean="0"/>
+                        <a:t> </a:t>
+                      </a:r>
+                      <a:r>
+                        <a:rPr lang="da-DK" dirty="0" err="1" smtClean="0"/>
+                        <a:t>first</a:t>
+                      </a:r>
+                      <a:endParaRPr lang="da-DK" dirty="0" smtClean="0"/>
+                    </a:p>
+                    <a:p>
+                      <a:pPr marL="0" marR="0" indent="0" algn="l" defTabSz="914400" rtl="0" eaLnBrk="1" fontAlgn="auto" latinLnBrk="0" hangingPunct="1">
+                        <a:lnSpc>
+                          <a:spcPct val="100000"/>
+                        </a:lnSpc>
+                        <a:spcBef>
+                          <a:spcPts val="0"/>
+                        </a:spcBef>
+                        <a:spcAft>
+                          <a:spcPts val="0"/>
+                        </a:spcAft>
+                        <a:buClrTx/>
+                        <a:buSzTx/>
+                        <a:buFontTx/>
+                        <a:buNone/>
+                        <a:tabLst/>
+                        <a:defRPr/>
+                      </a:pPr>
+                      <a:r>
+                        <a:rPr lang="da-DK" dirty="0" err="1" smtClean="0"/>
+                        <a:t>erase</a:t>
+                      </a:r>
+                      <a:r>
+                        <a:rPr lang="da-DK" dirty="0" smtClean="0"/>
+                        <a:t> last</a:t>
+                      </a:r>
+                    </a:p>
+                    <a:p>
+                      <a:pPr marL="0" marR="0" indent="0" algn="l" defTabSz="914400" rtl="0" eaLnBrk="1" fontAlgn="auto" latinLnBrk="0" hangingPunct="1">
+                        <a:lnSpc>
+                          <a:spcPct val="100000"/>
+                        </a:lnSpc>
+                        <a:spcBef>
+                          <a:spcPts val="0"/>
+                        </a:spcBef>
+                        <a:spcAft>
+                          <a:spcPts val="0"/>
+                        </a:spcAft>
+                        <a:buClrTx/>
+                        <a:buSzTx/>
+                        <a:buFontTx/>
+                        <a:buNone/>
+                        <a:tabLst/>
+                        <a:defRPr/>
+                      </a:pPr>
+                      <a:r>
+                        <a:rPr lang="da-DK" dirty="0" err="1" smtClean="0"/>
+                        <a:t>erase</a:t>
+                      </a:r>
+                      <a:r>
+                        <a:rPr lang="da-DK" dirty="0" smtClean="0"/>
+                        <a:t> </a:t>
+                      </a:r>
+                      <a:r>
+                        <a:rPr lang="da-DK" dirty="0" err="1" smtClean="0"/>
+                        <a:t>middle</a:t>
+                      </a:r>
+                      <a:endParaRPr lang="da-DK" dirty="0" smtClean="0"/>
+                    </a:p>
+                  </a:txBody>
+                  <a:tcPr>
+                    <a:lnR w="38100" cap="flat" cmpd="sng" algn="ctr">
+                      <a:solidFill>
+                        <a:schemeClr val="tx1"/>
+                      </a:solidFill>
+                      <a:prstDash val="solid"/>
+                      <a:round/>
+                      <a:headEnd type="none" w="med" len="med"/>
+                      <a:tailEnd type="none" w="med" len="med"/>
+                    </a:lnR>
+                  </a:tcPr>
+                </a:tc>
+                <a:tc>
+                  <a:txBody>
+                    <a:bodyPr/>
+                    <a:lstStyle/>
+                    <a:p>
+                      <a:endParaRPr lang="da-DK" dirty="0"/>
+                    </a:p>
+                  </a:txBody>
+                  <a:tcPr>
+                    <a:lnL w="38100" cap="flat" cmpd="sng" algn="ctr">
+                      <a:solidFill>
+                        <a:schemeClr val="tx1"/>
+                      </a:solidFill>
+                      <a:prstDash val="solid"/>
+                      <a:round/>
+                      <a:headEnd type="none" w="med" len="med"/>
+                      <a:tailEnd type="none" w="med" len="med"/>
+                    </a:lnL>
+                  </a:tcPr>
+                </a:tc>
+                <a:tc>
+                  <a:txBody>
+                    <a:bodyPr/>
+                    <a:lstStyle/>
+                    <a:p>
+                      <a:endParaRPr lang="da-DK" dirty="0"/>
+                    </a:p>
+                  </a:txBody>
+                  <a:tcPr/>
+                </a:tc>
+                <a:tc>
+                  <a:txBody>
+                    <a:bodyPr/>
+                    <a:lstStyle/>
+                    <a:p>
+                      <a:endParaRPr lang="da-DK" dirty="0"/>
+                    </a:p>
+                  </a:txBody>
+                  <a:tcPr/>
+                </a:tc>
+                <a:tc>
+                  <a:txBody>
+                    <a:bodyPr/>
+                    <a:lstStyle/>
+                    <a:p>
+                      <a:endParaRPr lang="da-DK" dirty="0"/>
+                    </a:p>
+                  </a:txBody>
+                  <a:tcPr/>
+                </a:tc>
+                <a:tc>
+                  <a:txBody>
+                    <a:bodyPr/>
+                    <a:lstStyle/>
+                    <a:p>
+                      <a:endParaRPr lang="da-DK" b="1" dirty="0"/>
+                    </a:p>
+                  </a:txBody>
+                  <a:tcPr/>
+                </a:tc>
+              </a:tr>
+              <a:tr h="708078">
+                <a:tc>
+                  <a:txBody>
+                    <a:bodyPr/>
+                    <a:lstStyle/>
+                    <a:p>
+                      <a:r>
+                        <a:rPr lang="da-DK" dirty="0" smtClean="0"/>
+                        <a:t>find</a:t>
+                      </a:r>
+                      <a:endParaRPr lang="da-DK" dirty="0"/>
+                    </a:p>
+                  </a:txBody>
+                  <a:tcPr>
+                    <a:lnR w="38100" cap="flat" cmpd="sng" algn="ctr">
+                      <a:solidFill>
+                        <a:schemeClr val="tx1"/>
+                      </a:solidFill>
+                      <a:prstDash val="solid"/>
+                      <a:round/>
+                      <a:headEnd type="none" w="med" len="med"/>
+                      <a:tailEnd type="none" w="med" len="med"/>
+                    </a:lnR>
+                  </a:tcPr>
+                </a:tc>
+                <a:tc>
+                  <a:txBody>
+                    <a:bodyPr/>
+                    <a:lstStyle/>
+                    <a:p>
+                      <a:endParaRPr lang="da-DK" dirty="0"/>
+                    </a:p>
+                  </a:txBody>
+                  <a:tcPr>
+                    <a:lnL w="38100" cap="flat" cmpd="sng" algn="ctr">
+                      <a:solidFill>
+                        <a:schemeClr val="tx1"/>
+                      </a:solidFill>
+                      <a:prstDash val="solid"/>
+                      <a:round/>
+                      <a:headEnd type="none" w="med" len="med"/>
+                      <a:tailEnd type="none" w="med" len="med"/>
+                    </a:lnL>
+                  </a:tcPr>
+                </a:tc>
+                <a:tc>
+                  <a:txBody>
+                    <a:bodyPr/>
+                    <a:lstStyle/>
+                    <a:p>
+                      <a:endParaRPr lang="da-DK" dirty="0"/>
+                    </a:p>
+                  </a:txBody>
+                  <a:tcPr/>
+                </a:tc>
+                <a:tc>
+                  <a:txBody>
+                    <a:bodyPr/>
+                    <a:lstStyle/>
+                    <a:p>
+                      <a:endParaRPr lang="da-DK" dirty="0"/>
+                    </a:p>
+                  </a:txBody>
+                  <a:tcPr/>
+                </a:tc>
+                <a:tc>
+                  <a:txBody>
+                    <a:bodyPr/>
+                    <a:lstStyle/>
+                    <a:p>
+                      <a:endParaRPr lang="da-DK" dirty="0"/>
+                    </a:p>
+                  </a:txBody>
+                  <a:tcPr/>
+                </a:tc>
+                <a:tc>
+                  <a:txBody>
+                    <a:bodyPr/>
+                    <a:lstStyle/>
+                    <a:p>
+                      <a:endParaRPr lang="da-DK" b="1" dirty="0"/>
+                    </a:p>
+                  </a:txBody>
+                  <a:tcPr/>
+                </a:tc>
+              </a:tr>
+              <a:tr h="708078">
+                <a:tc>
+                  <a:txBody>
+                    <a:bodyPr/>
+                    <a:lstStyle/>
+                    <a:p>
+                      <a:r>
+                        <a:rPr lang="da-DK" dirty="0" err="1" smtClean="0"/>
+                        <a:t>iteration</a:t>
+                      </a:r>
+                      <a:endParaRPr lang="da-DK" dirty="0"/>
+                    </a:p>
+                  </a:txBody>
+                  <a:tcPr>
+                    <a:lnR w="38100" cap="flat" cmpd="sng" algn="ctr">
+                      <a:solidFill>
+                        <a:schemeClr val="tx1"/>
+                      </a:solidFill>
+                      <a:prstDash val="solid"/>
+                      <a:round/>
+                      <a:headEnd type="none" w="med" len="med"/>
+                      <a:tailEnd type="none" w="med" len="med"/>
+                    </a:lnR>
+                  </a:tcPr>
+                </a:tc>
+                <a:tc>
+                  <a:txBody>
+                    <a:bodyPr/>
+                    <a:lstStyle/>
+                    <a:p>
+                      <a:endParaRPr lang="da-DK" dirty="0"/>
+                    </a:p>
+                  </a:txBody>
+                  <a:tcPr>
+                    <a:lnL w="38100" cap="flat" cmpd="sng" algn="ctr">
+                      <a:solidFill>
+                        <a:schemeClr val="tx1"/>
+                      </a:solidFill>
+                      <a:prstDash val="solid"/>
+                      <a:round/>
+                      <a:headEnd type="none" w="med" len="med"/>
+                      <a:tailEnd type="none" w="med" len="med"/>
+                    </a:lnL>
+                  </a:tcPr>
+                </a:tc>
+                <a:tc>
+                  <a:txBody>
+                    <a:bodyPr/>
+                    <a:lstStyle/>
+                    <a:p>
+                      <a:endParaRPr lang="da-DK" dirty="0"/>
+                    </a:p>
+                  </a:txBody>
+                  <a:tcPr/>
+                </a:tc>
+                <a:tc>
+                  <a:txBody>
+                    <a:bodyPr/>
+                    <a:lstStyle/>
+                    <a:p>
+                      <a:endParaRPr lang="da-DK" dirty="0"/>
+                    </a:p>
+                  </a:txBody>
+                  <a:tcPr/>
+                </a:tc>
+                <a:tc>
+                  <a:txBody>
+                    <a:bodyPr/>
+                    <a:lstStyle/>
+                    <a:p>
+                      <a:endParaRPr lang="da-DK" dirty="0"/>
+                    </a:p>
+                  </a:txBody>
+                  <a:tcPr/>
+                </a:tc>
+                <a:tc>
+                  <a:txBody>
+                    <a:bodyPr/>
+                    <a:lstStyle/>
+                    <a:p>
+                      <a:endParaRPr lang="da-DK" b="1" dirty="0"/>
+                    </a:p>
+                  </a:txBody>
+                  <a:tcPr/>
+                </a:tc>
+              </a:tr>
+              <a:tr h="708078">
+                <a:tc>
+                  <a:txBody>
+                    <a:bodyPr/>
+                    <a:lstStyle/>
+                    <a:p>
+                      <a:r>
+                        <a:rPr lang="da-DK" dirty="0" err="1" smtClean="0"/>
+                        <a:t>Sorted</a:t>
+                      </a:r>
+                      <a:r>
+                        <a:rPr lang="da-DK" dirty="0" smtClean="0"/>
+                        <a:t> </a:t>
+                      </a:r>
+                      <a:r>
+                        <a:rPr lang="da-DK" dirty="0" err="1" smtClean="0"/>
+                        <a:t>iteration</a:t>
+                      </a:r>
+                      <a:endParaRPr lang="da-DK" dirty="0"/>
+                    </a:p>
+                  </a:txBody>
+                  <a:tcPr>
+                    <a:lnR w="38100" cap="flat" cmpd="sng" algn="ctr">
+                      <a:solidFill>
+                        <a:schemeClr val="tx1"/>
+                      </a:solidFill>
+                      <a:prstDash val="solid"/>
+                      <a:round/>
+                      <a:headEnd type="none" w="med" len="med"/>
+                      <a:tailEnd type="none" w="med" len="med"/>
+                    </a:lnR>
+                  </a:tcPr>
+                </a:tc>
+                <a:tc>
+                  <a:txBody>
+                    <a:bodyPr/>
+                    <a:lstStyle/>
+                    <a:p>
+                      <a:endParaRPr lang="da-DK" dirty="0"/>
+                    </a:p>
+                  </a:txBody>
+                  <a:tcPr>
+                    <a:lnL w="38100" cap="flat" cmpd="sng" algn="ctr">
+                      <a:solidFill>
+                        <a:schemeClr val="tx1"/>
+                      </a:solidFill>
+                      <a:prstDash val="solid"/>
+                      <a:round/>
+                      <a:headEnd type="none" w="med" len="med"/>
+                      <a:tailEnd type="none" w="med" len="med"/>
+                    </a:lnL>
+                  </a:tcPr>
+                </a:tc>
+                <a:tc>
+                  <a:txBody>
+                    <a:bodyPr/>
+                    <a:lstStyle/>
+                    <a:p>
+                      <a:endParaRPr lang="da-DK" dirty="0"/>
+                    </a:p>
+                  </a:txBody>
+                  <a:tcPr/>
+                </a:tc>
+                <a:tc>
+                  <a:txBody>
+                    <a:bodyPr/>
+                    <a:lstStyle/>
+                    <a:p>
+                      <a:endParaRPr lang="da-DK" dirty="0"/>
+                    </a:p>
+                  </a:txBody>
+                  <a:tcPr/>
+                </a:tc>
+                <a:tc>
+                  <a:txBody>
+                    <a:bodyPr/>
+                    <a:lstStyle/>
+                    <a:p>
+                      <a:endParaRPr lang="da-DK" dirty="0"/>
+                    </a:p>
+                  </a:txBody>
+                  <a:tcPr/>
+                </a:tc>
+                <a:tc>
+                  <a:txBody>
+                    <a:bodyPr/>
+                    <a:lstStyle/>
+                    <a:p>
+                      <a:endParaRPr lang="da-DK" b="1" dirty="0"/>
+                    </a:p>
+                  </a:txBody>
+                  <a:tcPr/>
+                </a:tc>
+              </a:tr>
+            </a:tbl>
+          </a:graphicData>
+        </a:graphic>
+      </p:graphicFrame>
+      <p:sp>
+        <p:nvSpPr>
+          <p:cNvPr id="3" name="Footer Placeholder 2"/>
+          <p:cNvSpPr>
+            <a:spLocks noGrp="1"/>
+          </p:cNvSpPr>
+          <p:nvPr>
+            <p:ph type="ftr" sz="quarter" idx="11"/>
+          </p:nvPr>
+        </p:nvSpPr>
+        <p:spPr/>
+        <p:txBody>
+          <a:bodyPr/>
+          <a:lstStyle/>
+          <a:p>
+            <a:r>
+              <a:rPr lang="da-DK" smtClean="0"/>
+              <a:t>Recursion and Binary Trees</a:t>
+            </a:r>
+            <a:endParaRPr lang="da-DK"/>
+          </a:p>
+        </p:txBody>
+      </p:sp>
+      <p:sp>
+        <p:nvSpPr>
+          <p:cNvPr id="4" name="Date Placeholder 3"/>
+          <p:cNvSpPr>
+            <a:spLocks noGrp="1"/>
+          </p:cNvSpPr>
+          <p:nvPr>
+            <p:ph type="dt" sz="half" idx="10"/>
+          </p:nvPr>
+        </p:nvSpPr>
+        <p:spPr/>
+        <p:txBody>
+          <a:bodyPr/>
+          <a:lstStyle/>
+          <a:p>
+            <a:r>
+              <a:rPr lang="da-DK" dirty="0" err="1" smtClean="0"/>
+              <a:t>hau</a:t>
+            </a:r>
+            <a:endParaRPr lang="da-DK" dirty="0"/>
+          </a:p>
+        </p:txBody>
+      </p:sp>
+      <p:sp>
+        <p:nvSpPr>
+          <p:cNvPr id="5" name="Slide Number Placeholder 4"/>
+          <p:cNvSpPr>
+            <a:spLocks noGrp="1"/>
+          </p:cNvSpPr>
+          <p:nvPr>
+            <p:ph type="sldNum" sz="quarter" idx="12"/>
+          </p:nvPr>
+        </p:nvSpPr>
+        <p:spPr/>
+        <p:txBody>
+          <a:bodyPr/>
+          <a:lstStyle/>
+          <a:p>
+            <a:fld id="{DAB94411-2297-4BD0-B197-35E3682289EC}" type="slidenum">
+              <a:rPr lang="da-DK" smtClean="0"/>
+              <a:t>10</a:t>
+            </a:fld>
+            <a:endParaRPr lang="da-DK"/>
+          </a:p>
+        </p:txBody>
+      </p:sp>
+    </p:spTree>
+    <p:extLst>
+      <p:ext uri="{BB962C8B-B14F-4D97-AF65-F5344CB8AC3E}">
+        <p14:creationId xmlns:p14="http://schemas.microsoft.com/office/powerpoint/2010/main" val="1289407670"/>
+      </p:ext>
+    </p:extLst>
+  </p:cSld>
+  <p:clrMapOvr>
+    <a:masterClrMapping/>
+  </p:clrMapOvr>
+  <p:timing>
+    <p:tnLst>
+      <p:par>
+        <p:cTn id="1" dur="indefinite" restart="never" nodeType="tmRoot"/>
+      </p:par>
+    </p:tnLst>
+  </p:timing>
+</p:sld>
+</file>
+
+<file path=ppt/slides/slide2.xml><?xml version="1.0" encoding="utf-8"?>
+<p:sld xmlns:a="http://schemas.openxmlformats.org/drawingml/2006/main" xmlns:r="http://schemas.openxmlformats.org/officeDocument/2006/relationships" xmlns:p="http://schemas.openxmlformats.org/presentationml/2006/main">
+  <p:cSld>
+    <p:spTree>
+      <p:nvGrpSpPr>
+        <p:cNvPr id="1" name=""/>
+        <p:cNvGrpSpPr/>
+        <p:nvPr/>
+      </p:nvGrpSpPr>
+      <p:grpSpPr>
+        <a:xfrm>
+          <a:off x="0" y="0"/>
+          <a:ext cx="0" cy="0"/>
+          <a:chOff x="0" y="0"/>
+          <a:chExt cx="0" cy="0"/>
+        </a:xfrm>
+      </p:grpSpPr>
+      <p:sp>
+        <p:nvSpPr>
+          <p:cNvPr id="174082" name="Rectangle 2"/>
+          <p:cNvSpPr>
+            <a:spLocks noGrp="1" noChangeArrowheads="1"/>
+          </p:cNvSpPr>
+          <p:nvPr>
+            <p:ph type="title"/>
+          </p:nvPr>
+        </p:nvSpPr>
+        <p:spPr/>
+        <p:txBody>
+          <a:bodyPr/>
+          <a:lstStyle/>
+          <a:p>
+            <a:r>
+              <a:rPr lang="da-DK" dirty="0" err="1"/>
+              <a:t>Hashing</a:t>
+            </a:r>
+            <a:r>
+              <a:rPr lang="da-DK" dirty="0"/>
+              <a:t> – </a:t>
+            </a:r>
+            <a:r>
+              <a:rPr lang="da-DK" dirty="0" err="1" smtClean="0"/>
+              <a:t>principle</a:t>
+            </a:r>
+            <a:r>
+              <a:rPr lang="da-DK" dirty="0" smtClean="0"/>
+              <a:t> </a:t>
+            </a:r>
+            <a:endParaRPr lang="da-DK" dirty="0"/>
+          </a:p>
+        </p:txBody>
+      </p:sp>
+      <p:sp>
+        <p:nvSpPr>
+          <p:cNvPr id="174083" name="Rectangle 3"/>
+          <p:cNvSpPr>
+            <a:spLocks noGrp="1" noChangeArrowheads="1"/>
+          </p:cNvSpPr>
+          <p:nvPr>
+            <p:ph type="body" idx="1"/>
+          </p:nvPr>
+        </p:nvSpPr>
+        <p:spPr>
+          <a:xfrm>
+            <a:off x="457200" y="969959"/>
+            <a:ext cx="8229600" cy="4524276"/>
+          </a:xfrm>
+        </p:spPr>
+        <p:txBody>
+          <a:bodyPr/>
+          <a:lstStyle/>
+          <a:p>
+            <a:pPr>
+              <a:lnSpc>
+                <a:spcPct val="90000"/>
+              </a:lnSpc>
+            </a:pPr>
+            <a:r>
+              <a:rPr lang="da-DK" sz="2399" dirty="0"/>
+              <a:t>Data is </a:t>
+            </a:r>
+            <a:r>
+              <a:rPr lang="da-DK" sz="2399" dirty="0" err="1"/>
+              <a:t>stored</a:t>
+            </a:r>
+            <a:r>
+              <a:rPr lang="da-DK" sz="2399" dirty="0"/>
+              <a:t> in an </a:t>
+            </a:r>
+            <a:r>
+              <a:rPr lang="da-DK" sz="2399" b="1" dirty="0"/>
+              <a:t>array</a:t>
+            </a:r>
+          </a:p>
+          <a:p>
+            <a:pPr>
+              <a:lnSpc>
+                <a:spcPct val="90000"/>
+              </a:lnSpc>
+            </a:pPr>
+            <a:r>
+              <a:rPr lang="da-DK" sz="2399" dirty="0"/>
+              <a:t>The </a:t>
+            </a:r>
+            <a:r>
+              <a:rPr lang="da-DK" sz="2399" dirty="0" err="1"/>
+              <a:t>index</a:t>
+            </a:r>
+            <a:r>
+              <a:rPr lang="da-DK" sz="2399" dirty="0"/>
+              <a:t> </a:t>
+            </a:r>
+            <a:r>
+              <a:rPr lang="da-DK" sz="2399" b="1" dirty="0"/>
+              <a:t>is </a:t>
+            </a:r>
+            <a:r>
+              <a:rPr lang="da-DK" sz="2399" b="1" dirty="0" err="1"/>
+              <a:t>calculated</a:t>
+            </a:r>
+            <a:r>
+              <a:rPr lang="da-DK" sz="2399" dirty="0"/>
+              <a:t>  </a:t>
+            </a:r>
+            <a:r>
+              <a:rPr lang="da-DK" sz="2399" dirty="0" err="1"/>
+              <a:t>based</a:t>
+            </a:r>
+            <a:r>
+              <a:rPr lang="da-DK" sz="2399" dirty="0"/>
+              <a:t> on a </a:t>
+            </a:r>
+            <a:r>
+              <a:rPr lang="da-DK" sz="2399" dirty="0" err="1"/>
+              <a:t>key</a:t>
+            </a:r>
+            <a:r>
+              <a:rPr lang="da-DK" sz="2399" dirty="0"/>
+              <a:t>.</a:t>
+            </a:r>
+          </a:p>
+          <a:p>
+            <a:pPr lvl="1">
+              <a:lnSpc>
+                <a:spcPct val="90000"/>
+              </a:lnSpc>
+            </a:pPr>
+            <a:r>
+              <a:rPr lang="da-DK" sz="1999" b="1" dirty="0" err="1"/>
+              <a:t>index</a:t>
+            </a:r>
+            <a:r>
+              <a:rPr lang="da-DK" sz="1999" b="1" dirty="0"/>
+              <a:t> = hash-</a:t>
+            </a:r>
+            <a:r>
+              <a:rPr lang="da-DK" sz="1999" b="1" dirty="0" err="1"/>
+              <a:t>function</a:t>
+            </a:r>
+            <a:r>
+              <a:rPr lang="da-DK" sz="1999" b="1" dirty="0"/>
+              <a:t> (</a:t>
+            </a:r>
+            <a:r>
+              <a:rPr lang="da-DK" sz="1999" b="1" dirty="0" err="1"/>
+              <a:t>key</a:t>
+            </a:r>
+            <a:r>
+              <a:rPr lang="da-DK" sz="1999" b="1" dirty="0"/>
+              <a:t>)</a:t>
+            </a:r>
+            <a:r>
+              <a:rPr lang="da-DK" sz="1999" dirty="0"/>
+              <a:t>    		</a:t>
+            </a:r>
+            <a:endParaRPr lang="da-DK" sz="1800" dirty="0"/>
+          </a:p>
+          <a:p>
+            <a:pPr>
+              <a:lnSpc>
+                <a:spcPct val="90000"/>
+              </a:lnSpc>
+            </a:pPr>
+            <a:r>
+              <a:rPr lang="da-DK" sz="2399" dirty="0" err="1"/>
+              <a:t>Insert</a:t>
+            </a:r>
+            <a:r>
+              <a:rPr lang="da-DK" sz="2399" dirty="0"/>
+              <a:t> </a:t>
+            </a:r>
+          </a:p>
+          <a:p>
+            <a:pPr lvl="1">
+              <a:lnSpc>
+                <a:spcPct val="90000"/>
+              </a:lnSpc>
+            </a:pPr>
+            <a:r>
+              <a:rPr lang="da-DK" sz="1999" dirty="0"/>
+              <a:t>put(</a:t>
+            </a:r>
+            <a:r>
+              <a:rPr lang="da-DK" sz="1999" dirty="0" err="1"/>
+              <a:t>key</a:t>
+            </a:r>
+            <a:r>
+              <a:rPr lang="da-DK" sz="1999" dirty="0"/>
+              <a:t>, </a:t>
+            </a:r>
+            <a:r>
+              <a:rPr lang="da-DK" sz="1999" dirty="0" err="1"/>
+              <a:t>value</a:t>
+            </a:r>
+            <a:r>
+              <a:rPr lang="da-DK" sz="1999" dirty="0"/>
+              <a:t>)</a:t>
+            </a:r>
+          </a:p>
+          <a:p>
+            <a:pPr>
+              <a:lnSpc>
+                <a:spcPct val="90000"/>
+              </a:lnSpc>
+            </a:pPr>
+            <a:r>
+              <a:rPr lang="da-DK" sz="2399" dirty="0"/>
+              <a:t>”Search”</a:t>
+            </a:r>
+          </a:p>
+          <a:p>
+            <a:pPr lvl="1">
+              <a:lnSpc>
+                <a:spcPct val="90000"/>
+              </a:lnSpc>
+            </a:pPr>
+            <a:r>
+              <a:rPr lang="da-DK" sz="1999" dirty="0" err="1"/>
+              <a:t>get</a:t>
+            </a:r>
+            <a:r>
+              <a:rPr lang="da-DK" sz="1999" dirty="0"/>
+              <a:t> (</a:t>
+            </a:r>
+            <a:r>
+              <a:rPr lang="da-DK" sz="1999" dirty="0" err="1"/>
+              <a:t>key</a:t>
+            </a:r>
+            <a:r>
+              <a:rPr lang="da-DK" sz="1999" dirty="0"/>
+              <a:t>)</a:t>
+            </a:r>
+          </a:p>
+          <a:p>
+            <a:pPr>
+              <a:lnSpc>
+                <a:spcPct val="90000"/>
+              </a:lnSpc>
+            </a:pPr>
+            <a:r>
+              <a:rPr lang="da-DK" sz="2399" dirty="0"/>
+              <a:t>The</a:t>
+            </a:r>
+            <a:r>
+              <a:rPr lang="da-DK" sz="2399" b="1" dirty="0"/>
+              <a:t> hash-</a:t>
+            </a:r>
+            <a:r>
+              <a:rPr lang="da-DK" sz="2399" b="1" dirty="0" err="1"/>
+              <a:t>function</a:t>
+            </a:r>
+            <a:r>
+              <a:rPr lang="da-DK" sz="2399" b="1" dirty="0"/>
+              <a:t> </a:t>
+            </a:r>
+            <a:r>
+              <a:rPr lang="da-DK" sz="2399" dirty="0"/>
+              <a:t>must </a:t>
+            </a:r>
+          </a:p>
+          <a:p>
+            <a:pPr lvl="1">
+              <a:lnSpc>
+                <a:spcPct val="90000"/>
+              </a:lnSpc>
+            </a:pPr>
+            <a:r>
+              <a:rPr lang="da-DK" sz="1999" dirty="0" err="1"/>
+              <a:t>return</a:t>
+            </a:r>
+            <a:r>
+              <a:rPr lang="da-DK" sz="1999" dirty="0"/>
+              <a:t> an </a:t>
+            </a:r>
+            <a:r>
+              <a:rPr lang="da-DK" sz="1999" dirty="0" err="1"/>
+              <a:t>integer</a:t>
+            </a:r>
+            <a:r>
+              <a:rPr lang="da-DK" sz="1999" dirty="0"/>
+              <a:t>  (</a:t>
+            </a:r>
+            <a:r>
+              <a:rPr lang="da-DK" sz="1999" dirty="0" err="1"/>
+              <a:t>index</a:t>
+            </a:r>
+            <a:r>
+              <a:rPr lang="da-DK" sz="1999" dirty="0"/>
+              <a:t> &lt; </a:t>
+            </a:r>
+            <a:r>
+              <a:rPr lang="da-DK" sz="1999" dirty="0" err="1"/>
+              <a:t>size</a:t>
+            </a:r>
+            <a:r>
+              <a:rPr lang="da-DK" sz="1999" dirty="0"/>
+              <a:t> of </a:t>
+            </a:r>
+            <a:r>
+              <a:rPr lang="da-DK" sz="1999" dirty="0" err="1"/>
+              <a:t>table</a:t>
+            </a:r>
+            <a:r>
+              <a:rPr lang="da-DK" sz="1999" dirty="0"/>
+              <a:t>)</a:t>
+            </a:r>
+          </a:p>
+          <a:p>
+            <a:pPr lvl="1">
+              <a:lnSpc>
+                <a:spcPct val="90000"/>
+              </a:lnSpc>
+            </a:pPr>
+            <a:r>
+              <a:rPr lang="da-DK" sz="1999" dirty="0" err="1"/>
+              <a:t>be</a:t>
+            </a:r>
+            <a:r>
+              <a:rPr lang="da-DK" sz="1999" dirty="0"/>
+              <a:t> </a:t>
+            </a:r>
+            <a:r>
+              <a:rPr lang="da-DK" sz="1999" dirty="0" err="1"/>
+              <a:t>easy</a:t>
+            </a:r>
+            <a:r>
+              <a:rPr lang="da-DK" sz="1999" dirty="0"/>
+              <a:t> to </a:t>
+            </a:r>
+            <a:r>
+              <a:rPr lang="da-DK" sz="1999" dirty="0" err="1"/>
+              <a:t>calculate</a:t>
+            </a:r>
+            <a:r>
+              <a:rPr lang="da-DK" sz="1999" dirty="0"/>
+              <a:t> (</a:t>
+            </a:r>
+            <a:r>
+              <a:rPr lang="da-DK" sz="1999" dirty="0" err="1"/>
+              <a:t>why</a:t>
+            </a:r>
+            <a:r>
+              <a:rPr lang="da-DK" sz="1999" dirty="0"/>
+              <a:t>?)</a:t>
+            </a:r>
+            <a:endParaRPr lang="da-DK" sz="1999" dirty="0"/>
+          </a:p>
+          <a:p>
+            <a:pPr lvl="1">
+              <a:lnSpc>
+                <a:spcPct val="90000"/>
+              </a:lnSpc>
+            </a:pPr>
+            <a:r>
+              <a:rPr lang="da-DK" sz="1999" dirty="0" err="1"/>
+              <a:t>Minimize</a:t>
+            </a:r>
+            <a:r>
+              <a:rPr lang="da-DK" sz="1999" dirty="0"/>
+              <a:t> the </a:t>
+            </a:r>
+            <a:r>
+              <a:rPr lang="da-DK" sz="1999" dirty="0" err="1"/>
+              <a:t>number</a:t>
+            </a:r>
+            <a:r>
+              <a:rPr lang="da-DK" sz="1999" dirty="0"/>
+              <a:t> of </a:t>
+            </a:r>
+            <a:r>
+              <a:rPr lang="da-DK" sz="1999" dirty="0" err="1"/>
+              <a:t>collisions</a:t>
+            </a:r>
+            <a:endParaRPr lang="da-DK" sz="1999" dirty="0"/>
+          </a:p>
+          <a:p>
+            <a:pPr lvl="1">
+              <a:lnSpc>
+                <a:spcPct val="90000"/>
+              </a:lnSpc>
+            </a:pPr>
+            <a:r>
+              <a:rPr lang="da-DK" sz="1999" dirty="0" err="1"/>
+              <a:t>distribute</a:t>
+            </a:r>
+            <a:r>
+              <a:rPr lang="da-DK" sz="1999" dirty="0"/>
+              <a:t> </a:t>
+            </a:r>
+            <a:r>
+              <a:rPr lang="da-DK" sz="1999" dirty="0"/>
+              <a:t>data elements </a:t>
+            </a:r>
+            <a:r>
+              <a:rPr lang="da-DK" sz="1999" dirty="0" err="1"/>
+              <a:t>evenly</a:t>
+            </a:r>
+            <a:r>
+              <a:rPr lang="da-DK" sz="1999" dirty="0"/>
+              <a:t> </a:t>
+            </a:r>
+            <a:r>
+              <a:rPr lang="da-DK" sz="1999" dirty="0" err="1"/>
+              <a:t>across</a:t>
+            </a:r>
+            <a:r>
+              <a:rPr lang="da-DK" sz="1999" dirty="0"/>
+              <a:t> the </a:t>
+            </a:r>
+            <a:r>
+              <a:rPr lang="da-DK" sz="1999" dirty="0" err="1"/>
+              <a:t>table</a:t>
+            </a:r>
+            <a:r>
+              <a:rPr lang="da-DK" sz="1999" dirty="0"/>
+              <a:t> (</a:t>
+            </a:r>
+            <a:r>
+              <a:rPr lang="da-DK" sz="1999" dirty="0" err="1"/>
+              <a:t>why</a:t>
+            </a:r>
+            <a:r>
+              <a:rPr lang="da-DK" sz="1999" dirty="0"/>
+              <a:t>?)</a:t>
+            </a:r>
+          </a:p>
+          <a:p>
+            <a:pPr>
+              <a:lnSpc>
+                <a:spcPct val="90000"/>
+              </a:lnSpc>
+            </a:pPr>
+            <a:endParaRPr lang="da-DK" sz="2399" dirty="0"/>
+          </a:p>
+        </p:txBody>
+      </p:sp>
+    </p:spTree>
+    <p:extLst>
+      <p:ext uri="{BB962C8B-B14F-4D97-AF65-F5344CB8AC3E}">
+        <p14:creationId xmlns:p14="http://schemas.microsoft.com/office/powerpoint/2010/main" val="1423275552"/>
+      </p:ext>
+    </p:extLst>
+  </p:cSld>
+  <p:clrMapOvr>
+    <a:masterClrMapping/>
+  </p:clrMapOvr>
+  <p:transition/>
+  <p:timing>
+    <p:tnLst>
+      <p:par>
+        <p:cTn id="1" dur="indefinite" restart="never" nodeType="tmRoot"/>
+      </p:par>
+    </p:tnLst>
+  </p:timing>
+</p:sld>
+</file>
+
+<file path=ppt/slides/slide3.xml><?xml version="1.0" encoding="utf-8"?>
+<p:sld xmlns:a="http://schemas.openxmlformats.org/drawingml/2006/main" xmlns:r="http://schemas.openxmlformats.org/officeDocument/2006/relationships" xmlns:p="http://schemas.openxmlformats.org/presentationml/2006/main">
+  <p:cSld>
+    <p:spTree>
+      <p:nvGrpSpPr>
+        <p:cNvPr id="1" name=""/>
+        <p:cNvGrpSpPr/>
+        <p:nvPr/>
+      </p:nvGrpSpPr>
+      <p:grpSpPr>
+        <a:xfrm>
+          <a:off x="0" y="0"/>
+          <a:ext cx="0" cy="0"/>
+          <a:chOff x="0" y="0"/>
+          <a:chExt cx="0" cy="0"/>
+        </a:xfrm>
+      </p:grpSpPr>
+      <p:graphicFrame>
+        <p:nvGraphicFramePr>
+          <p:cNvPr id="226371" name="Group 67"/>
+          <p:cNvGraphicFramePr>
+            <a:graphicFrameLocks noGrp="1"/>
+          </p:cNvGraphicFramePr>
+          <p:nvPr/>
+        </p:nvGraphicFramePr>
+        <p:xfrm>
+          <a:off x="6514377" y="550349"/>
+          <a:ext cx="1152095" cy="3814933"/>
+        </p:xfrm>
+        <a:graphic>
+          <a:graphicData uri="http://schemas.openxmlformats.org/drawingml/2006/table">
+            <a:tbl>
+              <a:tblPr/>
+              <a:tblGrid>
+                <a:gridCol w="431639"/>
+                <a:gridCol w="720456"/>
+              </a:tblGrid>
+              <a:tr h="406249">
+                <a:tc>
+                  <a:txBody>
+                    <a:bodyPr/>
+                    <a:lstStyle/>
+                    <a:p>
+                      <a:pPr marL="0" marR="0" lvl="0" indent="0" algn="l" defTabSz="914400" rtl="0" eaLnBrk="1" fontAlgn="base" latinLnBrk="0" hangingPunct="1">
+                        <a:lnSpc>
+                          <a:spcPct val="100000"/>
+                        </a:lnSpc>
+                        <a:spcBef>
+                          <a:spcPct val="20000"/>
+                        </a:spcBef>
+                        <a:spcAft>
+                          <a:spcPct val="0"/>
+                        </a:spcAft>
+                        <a:buClrTx/>
+                        <a:buSzTx/>
+                        <a:buFontTx/>
+                        <a:buNone/>
+                        <a:tabLst/>
+                      </a:pPr>
+                      <a:r>
+                        <a:rPr kumimoji="0" lang="da-DK" sz="1200" b="0" i="0" u="none" strike="noStrike" cap="none" normalizeH="0" baseline="0" smtClean="0">
+                          <a:ln>
+                            <a:noFill/>
+                          </a:ln>
+                          <a:solidFill>
+                            <a:schemeClr val="tx1"/>
+                          </a:solidFill>
+                          <a:effectLst/>
+                          <a:latin typeface="Arial" charset="0"/>
+                        </a:rPr>
+                        <a:t>0</a:t>
+                      </a:r>
+                    </a:p>
+                  </a:txBody>
+                  <a:tcPr marL="91406" marR="91406" marT="45703" marB="45703" horzOverflow="overflow">
+                    <a:lnL w="28575" cap="flat" cmpd="sng" algn="ctr">
+                      <a:solidFill>
+                        <a:schemeClr val="tx1"/>
+                      </a:solidFill>
+                      <a:prstDash val="solid"/>
+                      <a:round/>
+                      <a:headEnd type="none" w="sm" len="sm"/>
+                      <a:tailEnd type="none" w="sm" len="sm"/>
+                    </a:lnL>
+                    <a:lnR w="12700" cap="flat" cmpd="sng" algn="ctr">
+                      <a:solidFill>
+                        <a:schemeClr val="tx1"/>
+                      </a:solidFill>
+                      <a:prstDash val="solid"/>
+                      <a:round/>
+                      <a:headEnd type="none" w="sm" len="sm"/>
+                      <a:tailEnd type="none" w="sm" len="sm"/>
+                    </a:lnR>
+                    <a:lnT w="28575" cap="flat" cmpd="sng" algn="ctr">
+                      <a:solidFill>
+                        <a:schemeClr val="tx1"/>
+                      </a:solidFill>
+                      <a:prstDash val="solid"/>
+                      <a:round/>
+                      <a:headEnd type="none" w="sm" len="sm"/>
+                      <a:tailEnd type="none" w="sm" len="sm"/>
+                    </a:lnT>
+                    <a:lnB w="12700" cap="flat" cmpd="sng" algn="ctr">
+                      <a:solidFill>
+                        <a:schemeClr val="tx1"/>
+                      </a:solidFill>
+                      <a:prstDash val="solid"/>
+                      <a:round/>
+                      <a:headEnd type="none" w="sm" len="sm"/>
+                      <a:tailEnd type="none" w="sm" len="sm"/>
+                    </a:lnB>
+                    <a:lnTlToBr>
+                      <a:noFill/>
+                    </a:lnTlToBr>
+                    <a:lnBlToTr>
+                      <a:noFill/>
+                    </a:lnBlToTr>
+                    <a:noFill/>
+                  </a:tcPr>
+                </a:tc>
+                <a:tc>
+                  <a:txBody>
+                    <a:bodyPr/>
+                    <a:lstStyle/>
+                    <a:p>
+                      <a:pPr marL="0" marR="0" lvl="0" indent="0" algn="l" defTabSz="914400" rtl="0" eaLnBrk="1" fontAlgn="base" latinLnBrk="0" hangingPunct="1">
+                        <a:lnSpc>
+                          <a:spcPct val="100000"/>
+                        </a:lnSpc>
+                        <a:spcBef>
+                          <a:spcPct val="20000"/>
+                        </a:spcBef>
+                        <a:spcAft>
+                          <a:spcPct val="0"/>
+                        </a:spcAft>
+                        <a:buClrTx/>
+                        <a:buSzTx/>
+                        <a:buFontTx/>
+                        <a:buNone/>
+                        <a:tabLst/>
+                      </a:pPr>
+                      <a:r>
+                        <a:rPr kumimoji="0" lang="da-DK" sz="1200" b="0" i="0" u="none" strike="noStrike" cap="none" normalizeH="0" baseline="0" smtClean="0">
+                          <a:ln>
+                            <a:noFill/>
+                          </a:ln>
+                          <a:solidFill>
+                            <a:schemeClr val="tx1"/>
+                          </a:solidFill>
+                          <a:effectLst/>
+                          <a:latin typeface="Arial" charset="0"/>
+                        </a:rPr>
+                        <a:t>11</a:t>
+                      </a:r>
+                    </a:p>
+                  </a:txBody>
+                  <a:tcPr marL="91406" marR="91406" marT="45703" marB="45703" horzOverflow="overflow">
+                    <a:lnL w="12700" cap="flat" cmpd="sng" algn="ctr">
+                      <a:solidFill>
+                        <a:schemeClr val="tx1"/>
+                      </a:solidFill>
+                      <a:prstDash val="solid"/>
+                      <a:round/>
+                      <a:headEnd type="none" w="sm" len="sm"/>
+                      <a:tailEnd type="none" w="sm" len="sm"/>
+                    </a:lnL>
+                    <a:lnR w="28575" cap="flat" cmpd="sng" algn="ctr">
+                      <a:solidFill>
+                        <a:schemeClr val="tx1"/>
+                      </a:solidFill>
+                      <a:prstDash val="solid"/>
+                      <a:round/>
+                      <a:headEnd type="none" w="sm" len="sm"/>
+                      <a:tailEnd type="none" w="sm" len="sm"/>
+                    </a:lnR>
+                    <a:lnT w="28575" cap="flat" cmpd="sng" algn="ctr">
+                      <a:solidFill>
+                        <a:schemeClr val="tx1"/>
+                      </a:solidFill>
+                      <a:prstDash val="solid"/>
+                      <a:round/>
+                      <a:headEnd type="none" w="sm" len="sm"/>
+                      <a:tailEnd type="none" w="sm" len="sm"/>
+                    </a:lnT>
+                    <a:lnB w="12700" cap="flat" cmpd="sng" algn="ctr">
+                      <a:solidFill>
+                        <a:schemeClr val="tx1"/>
+                      </a:solidFill>
+                      <a:prstDash val="solid"/>
+                      <a:round/>
+                      <a:headEnd type="none" w="sm" len="sm"/>
+                      <a:tailEnd type="none" w="sm" len="sm"/>
+                    </a:lnB>
+                    <a:lnTlToBr>
+                      <a:noFill/>
+                    </a:lnTlToBr>
+                    <a:lnBlToTr>
+                      <a:noFill/>
+                    </a:lnBlToTr>
+                    <a:noFill/>
+                  </a:tcPr>
+                </a:tc>
+              </a:tr>
+              <a:tr h="341186">
+                <a:tc>
+                  <a:txBody>
+                    <a:bodyPr/>
+                    <a:lstStyle/>
+                    <a:p>
+                      <a:pPr marL="0" marR="0" lvl="0" indent="0" algn="l" defTabSz="914400" rtl="0" eaLnBrk="1" fontAlgn="base" latinLnBrk="0" hangingPunct="1">
+                        <a:lnSpc>
+                          <a:spcPct val="100000"/>
+                        </a:lnSpc>
+                        <a:spcBef>
+                          <a:spcPct val="20000"/>
+                        </a:spcBef>
+                        <a:spcAft>
+                          <a:spcPct val="0"/>
+                        </a:spcAft>
+                        <a:buClrTx/>
+                        <a:buSzTx/>
+                        <a:buFontTx/>
+                        <a:buNone/>
+                        <a:tabLst/>
+                      </a:pPr>
+                      <a:r>
+                        <a:rPr kumimoji="0" lang="da-DK" sz="1200" b="0" i="0" u="none" strike="noStrike" cap="none" normalizeH="0" baseline="0" smtClean="0">
+                          <a:ln>
+                            <a:noFill/>
+                          </a:ln>
+                          <a:solidFill>
+                            <a:schemeClr val="tx1"/>
+                          </a:solidFill>
+                          <a:effectLst/>
+                          <a:latin typeface="Arial" charset="0"/>
+                        </a:rPr>
+                        <a:t>1</a:t>
+                      </a:r>
+                    </a:p>
+                  </a:txBody>
+                  <a:tcPr marL="91406" marR="91406" marT="45703" marB="45703" horzOverflow="overflow">
+                    <a:lnL w="28575" cap="flat" cmpd="sng" algn="ctr">
+                      <a:solidFill>
+                        <a:schemeClr val="tx1"/>
+                      </a:solidFill>
+                      <a:prstDash val="solid"/>
+                      <a:round/>
+                      <a:headEnd type="none" w="sm" len="sm"/>
+                      <a:tailEnd type="none" w="sm" len="sm"/>
+                    </a:lnL>
+                    <a:lnR w="12700" cap="flat" cmpd="sng" algn="ctr">
+                      <a:solidFill>
+                        <a:schemeClr val="tx1"/>
+                      </a:solidFill>
+                      <a:prstDash val="solid"/>
+                      <a:round/>
+                      <a:headEnd type="none" w="sm" len="sm"/>
+                      <a:tailEnd type="none" w="sm" len="sm"/>
+                    </a:lnR>
+                    <a:lnT w="12700" cap="flat" cmpd="sng" algn="ctr">
+                      <a:solidFill>
+                        <a:schemeClr val="tx1"/>
+                      </a:solidFill>
+                      <a:prstDash val="solid"/>
+                      <a:round/>
+                      <a:headEnd type="none" w="sm" len="sm"/>
+                      <a:tailEnd type="none" w="sm" len="sm"/>
+                    </a:lnT>
+                    <a:lnB w="12700" cap="flat" cmpd="sng" algn="ctr">
+                      <a:solidFill>
+                        <a:schemeClr val="tx1"/>
+                      </a:solidFill>
+                      <a:prstDash val="solid"/>
+                      <a:round/>
+                      <a:headEnd type="none" w="sm" len="sm"/>
+                      <a:tailEnd type="none" w="sm" len="sm"/>
+                    </a:lnB>
+                    <a:lnTlToBr>
+                      <a:noFill/>
+                    </a:lnTlToBr>
+                    <a:lnBlToTr>
+                      <a:noFill/>
+                    </a:lnBlToTr>
+                    <a:noFill/>
+                  </a:tcPr>
+                </a:tc>
+                <a:tc>
+                  <a:txBody>
+                    <a:bodyPr/>
+                    <a:lstStyle/>
+                    <a:p>
+                      <a:pPr marL="0" marR="0" lvl="0" indent="0" algn="l" defTabSz="914400" rtl="0" eaLnBrk="1" fontAlgn="base" latinLnBrk="0" hangingPunct="1">
+                        <a:lnSpc>
+                          <a:spcPct val="100000"/>
+                        </a:lnSpc>
+                        <a:spcBef>
+                          <a:spcPct val="20000"/>
+                        </a:spcBef>
+                        <a:spcAft>
+                          <a:spcPct val="0"/>
+                        </a:spcAft>
+                        <a:buClrTx/>
+                        <a:buSzTx/>
+                        <a:buFontTx/>
+                        <a:buNone/>
+                        <a:tabLst/>
+                      </a:pPr>
+                      <a:r>
+                        <a:rPr kumimoji="0" lang="da-DK" sz="1200" b="0" i="0" u="none" strike="noStrike" cap="none" normalizeH="0" baseline="0" smtClean="0">
+                          <a:ln>
+                            <a:noFill/>
+                          </a:ln>
+                          <a:solidFill>
+                            <a:schemeClr val="tx1"/>
+                          </a:solidFill>
+                          <a:effectLst/>
+                          <a:latin typeface="Arial" charset="0"/>
+                        </a:rPr>
+                        <a:t>1</a:t>
+                      </a:r>
+                    </a:p>
+                  </a:txBody>
+                  <a:tcPr marL="91406" marR="91406" marT="45703" marB="45703" horzOverflow="overflow">
+                    <a:lnL w="12700" cap="flat" cmpd="sng" algn="ctr">
+                      <a:solidFill>
+                        <a:schemeClr val="tx1"/>
+                      </a:solidFill>
+                      <a:prstDash val="solid"/>
+                      <a:round/>
+                      <a:headEnd type="none" w="sm" len="sm"/>
+                      <a:tailEnd type="none" w="sm" len="sm"/>
+                    </a:lnL>
+                    <a:lnR w="28575" cap="flat" cmpd="sng" algn="ctr">
+                      <a:solidFill>
+                        <a:schemeClr val="tx1"/>
+                      </a:solidFill>
+                      <a:prstDash val="solid"/>
+                      <a:round/>
+                      <a:headEnd type="none" w="sm" len="sm"/>
+                      <a:tailEnd type="none" w="sm" len="sm"/>
+                    </a:lnR>
+                    <a:lnT w="12700" cap="flat" cmpd="sng" algn="ctr">
+                      <a:solidFill>
+                        <a:schemeClr val="tx1"/>
+                      </a:solidFill>
+                      <a:prstDash val="solid"/>
+                      <a:round/>
+                      <a:headEnd type="none" w="sm" len="sm"/>
+                      <a:tailEnd type="none" w="sm" len="sm"/>
+                    </a:lnT>
+                    <a:lnB w="12700" cap="flat" cmpd="sng" algn="ctr">
+                      <a:solidFill>
+                        <a:schemeClr val="tx1"/>
+                      </a:solidFill>
+                      <a:prstDash val="solid"/>
+                      <a:round/>
+                      <a:headEnd type="none" w="sm" len="sm"/>
+                      <a:tailEnd type="none" w="sm" len="sm"/>
+                    </a:lnB>
+                    <a:lnTlToBr>
+                      <a:noFill/>
+                    </a:lnTlToBr>
+                    <a:lnBlToTr>
+                      <a:noFill/>
+                    </a:lnBlToTr>
+                    <a:noFill/>
+                  </a:tcPr>
+                </a:tc>
+              </a:tr>
+              <a:tr h="341186">
+                <a:tc>
+                  <a:txBody>
+                    <a:bodyPr/>
+                    <a:lstStyle/>
+                    <a:p>
+                      <a:pPr marL="0" marR="0" lvl="0" indent="0" algn="l" defTabSz="914400" rtl="0" eaLnBrk="1" fontAlgn="base" latinLnBrk="0" hangingPunct="1">
+                        <a:lnSpc>
+                          <a:spcPct val="100000"/>
+                        </a:lnSpc>
+                        <a:spcBef>
+                          <a:spcPct val="20000"/>
+                        </a:spcBef>
+                        <a:spcAft>
+                          <a:spcPct val="0"/>
+                        </a:spcAft>
+                        <a:buClrTx/>
+                        <a:buSzTx/>
+                        <a:buFontTx/>
+                        <a:buNone/>
+                        <a:tabLst/>
+                      </a:pPr>
+                      <a:r>
+                        <a:rPr kumimoji="0" lang="da-DK" sz="1200" b="0" i="0" u="none" strike="noStrike" cap="none" normalizeH="0" baseline="0" smtClean="0">
+                          <a:ln>
+                            <a:noFill/>
+                          </a:ln>
+                          <a:solidFill>
+                            <a:schemeClr val="tx1"/>
+                          </a:solidFill>
+                          <a:effectLst/>
+                          <a:latin typeface="Arial" charset="0"/>
+                        </a:rPr>
+                        <a:t>2</a:t>
+                      </a:r>
+                    </a:p>
+                  </a:txBody>
+                  <a:tcPr marL="91406" marR="91406" marT="45703" marB="45703" horzOverflow="overflow">
+                    <a:lnL w="28575" cap="flat" cmpd="sng" algn="ctr">
+                      <a:solidFill>
+                        <a:schemeClr val="tx1"/>
+                      </a:solidFill>
+                      <a:prstDash val="solid"/>
+                      <a:round/>
+                      <a:headEnd type="none" w="sm" len="sm"/>
+                      <a:tailEnd type="none" w="sm" len="sm"/>
+                    </a:lnL>
+                    <a:lnR w="12700" cap="flat" cmpd="sng" algn="ctr">
+                      <a:solidFill>
+                        <a:schemeClr val="tx1"/>
+                      </a:solidFill>
+                      <a:prstDash val="solid"/>
+                      <a:round/>
+                      <a:headEnd type="none" w="sm" len="sm"/>
+                      <a:tailEnd type="none" w="sm" len="sm"/>
+                    </a:lnR>
+                    <a:lnT w="12700" cap="flat" cmpd="sng" algn="ctr">
+                      <a:solidFill>
+                        <a:schemeClr val="tx1"/>
+                      </a:solidFill>
+                      <a:prstDash val="solid"/>
+                      <a:round/>
+                      <a:headEnd type="none" w="sm" len="sm"/>
+                      <a:tailEnd type="none" w="sm" len="sm"/>
+                    </a:lnT>
+                    <a:lnB w="12700" cap="flat" cmpd="sng" algn="ctr">
+                      <a:solidFill>
+                        <a:schemeClr val="tx1"/>
+                      </a:solidFill>
+                      <a:prstDash val="solid"/>
+                      <a:round/>
+                      <a:headEnd type="none" w="sm" len="sm"/>
+                      <a:tailEnd type="none" w="sm" len="sm"/>
+                    </a:lnB>
+                    <a:lnTlToBr>
+                      <a:noFill/>
+                    </a:lnTlToBr>
+                    <a:lnBlToTr>
+                      <a:noFill/>
+                    </a:lnBlToTr>
+                    <a:noFill/>
+                  </a:tcPr>
+                </a:tc>
+                <a:tc>
+                  <a:txBody>
+                    <a:bodyPr/>
+                    <a:lstStyle/>
+                    <a:p>
+                      <a:pPr marL="0" marR="0" lvl="0" indent="0" algn="l" defTabSz="914400" rtl="0" eaLnBrk="1" fontAlgn="base" latinLnBrk="0" hangingPunct="1">
+                        <a:lnSpc>
+                          <a:spcPct val="100000"/>
+                        </a:lnSpc>
+                        <a:spcBef>
+                          <a:spcPct val="20000"/>
+                        </a:spcBef>
+                        <a:spcAft>
+                          <a:spcPct val="0"/>
+                        </a:spcAft>
+                        <a:buClrTx/>
+                        <a:buSzTx/>
+                        <a:buFontTx/>
+                        <a:buNone/>
+                        <a:tabLst/>
+                      </a:pPr>
+                      <a:r>
+                        <a:rPr kumimoji="0" lang="da-DK" sz="1200" b="0" i="0" u="none" strike="noStrike" cap="none" normalizeH="0" baseline="0" smtClean="0">
+                          <a:ln>
+                            <a:noFill/>
+                          </a:ln>
+                          <a:solidFill>
+                            <a:schemeClr val="tx1"/>
+                          </a:solidFill>
+                          <a:effectLst/>
+                          <a:latin typeface="Arial" charset="0"/>
+                        </a:rPr>
+                        <a:t>13</a:t>
+                      </a:r>
+                    </a:p>
+                  </a:txBody>
+                  <a:tcPr marL="91406" marR="91406" marT="45703" marB="45703" horzOverflow="overflow">
+                    <a:lnL w="12700" cap="flat" cmpd="sng" algn="ctr">
+                      <a:solidFill>
+                        <a:schemeClr val="tx1"/>
+                      </a:solidFill>
+                      <a:prstDash val="solid"/>
+                      <a:round/>
+                      <a:headEnd type="none" w="sm" len="sm"/>
+                      <a:tailEnd type="none" w="sm" len="sm"/>
+                    </a:lnL>
+                    <a:lnR w="28575" cap="flat" cmpd="sng" algn="ctr">
+                      <a:solidFill>
+                        <a:schemeClr val="tx1"/>
+                      </a:solidFill>
+                      <a:prstDash val="solid"/>
+                      <a:round/>
+                      <a:headEnd type="none" w="sm" len="sm"/>
+                      <a:tailEnd type="none" w="sm" len="sm"/>
+                    </a:lnR>
+                    <a:lnT w="12700" cap="flat" cmpd="sng" algn="ctr">
+                      <a:solidFill>
+                        <a:schemeClr val="tx1"/>
+                      </a:solidFill>
+                      <a:prstDash val="solid"/>
+                      <a:round/>
+                      <a:headEnd type="none" w="sm" len="sm"/>
+                      <a:tailEnd type="none" w="sm" len="sm"/>
+                    </a:lnT>
+                    <a:lnB w="12700" cap="flat" cmpd="sng" algn="ctr">
+                      <a:solidFill>
+                        <a:schemeClr val="tx1"/>
+                      </a:solidFill>
+                      <a:prstDash val="solid"/>
+                      <a:round/>
+                      <a:headEnd type="none" w="sm" len="sm"/>
+                      <a:tailEnd type="none" w="sm" len="sm"/>
+                    </a:lnB>
+                    <a:lnTlToBr>
+                      <a:noFill/>
+                    </a:lnTlToBr>
+                    <a:lnBlToTr>
+                      <a:noFill/>
+                    </a:lnBlToTr>
+                    <a:noFill/>
+                  </a:tcPr>
+                </a:tc>
+              </a:tr>
+              <a:tr h="339598">
+                <a:tc>
+                  <a:txBody>
+                    <a:bodyPr/>
+                    <a:lstStyle/>
+                    <a:p>
+                      <a:pPr marL="0" marR="0" lvl="0" indent="0" algn="l" defTabSz="914400" rtl="0" eaLnBrk="1" fontAlgn="base" latinLnBrk="0" hangingPunct="1">
+                        <a:lnSpc>
+                          <a:spcPct val="100000"/>
+                        </a:lnSpc>
+                        <a:spcBef>
+                          <a:spcPct val="20000"/>
+                        </a:spcBef>
+                        <a:spcAft>
+                          <a:spcPct val="0"/>
+                        </a:spcAft>
+                        <a:buClrTx/>
+                        <a:buSzTx/>
+                        <a:buFontTx/>
+                        <a:buNone/>
+                        <a:tabLst/>
+                      </a:pPr>
+                      <a:r>
+                        <a:rPr kumimoji="0" lang="da-DK" sz="1200" b="0" i="0" u="none" strike="noStrike" cap="none" normalizeH="0" baseline="0" smtClean="0">
+                          <a:ln>
+                            <a:noFill/>
+                          </a:ln>
+                          <a:solidFill>
+                            <a:schemeClr val="tx1"/>
+                          </a:solidFill>
+                          <a:effectLst/>
+                          <a:latin typeface="Arial" charset="0"/>
+                        </a:rPr>
+                        <a:t>3</a:t>
+                      </a:r>
+                    </a:p>
+                  </a:txBody>
+                  <a:tcPr marL="91406" marR="91406" marT="45703" marB="45703" horzOverflow="overflow">
+                    <a:lnL w="28575" cap="flat" cmpd="sng" algn="ctr">
+                      <a:solidFill>
+                        <a:schemeClr val="tx1"/>
+                      </a:solidFill>
+                      <a:prstDash val="solid"/>
+                      <a:round/>
+                      <a:headEnd type="none" w="sm" len="sm"/>
+                      <a:tailEnd type="none" w="sm" len="sm"/>
+                    </a:lnL>
+                    <a:lnR w="12700" cap="flat" cmpd="sng" algn="ctr">
+                      <a:solidFill>
+                        <a:schemeClr val="tx1"/>
+                      </a:solidFill>
+                      <a:prstDash val="solid"/>
+                      <a:round/>
+                      <a:headEnd type="none" w="sm" len="sm"/>
+                      <a:tailEnd type="none" w="sm" len="sm"/>
+                    </a:lnR>
+                    <a:lnT w="12700" cap="flat" cmpd="sng" algn="ctr">
+                      <a:solidFill>
+                        <a:schemeClr val="tx1"/>
+                      </a:solidFill>
+                      <a:prstDash val="solid"/>
+                      <a:round/>
+                      <a:headEnd type="none" w="sm" len="sm"/>
+                      <a:tailEnd type="none" w="sm" len="sm"/>
+                    </a:lnT>
+                    <a:lnB w="12700" cap="flat" cmpd="sng" algn="ctr">
+                      <a:solidFill>
+                        <a:schemeClr val="tx1"/>
+                      </a:solidFill>
+                      <a:prstDash val="solid"/>
+                      <a:round/>
+                      <a:headEnd type="none" w="sm" len="sm"/>
+                      <a:tailEnd type="none" w="sm" len="sm"/>
+                    </a:lnB>
+                    <a:lnTlToBr>
+                      <a:noFill/>
+                    </a:lnTlToBr>
+                    <a:lnBlToTr>
+                      <a:noFill/>
+                    </a:lnBlToTr>
+                    <a:noFill/>
+                  </a:tcPr>
+                </a:tc>
+                <a:tc>
+                  <a:txBody>
+                    <a:bodyPr/>
+                    <a:lstStyle/>
+                    <a:p>
+                      <a:pPr marL="0" marR="0" lvl="0" indent="0" algn="l" defTabSz="914400" rtl="0" eaLnBrk="1" fontAlgn="base" latinLnBrk="0" hangingPunct="1">
+                        <a:lnSpc>
+                          <a:spcPct val="100000"/>
+                        </a:lnSpc>
+                        <a:spcBef>
+                          <a:spcPct val="20000"/>
+                        </a:spcBef>
+                        <a:spcAft>
+                          <a:spcPct val="0"/>
+                        </a:spcAft>
+                        <a:buClrTx/>
+                        <a:buSzTx/>
+                        <a:buFontTx/>
+                        <a:buNone/>
+                        <a:tabLst/>
+                      </a:pPr>
+                      <a:endParaRPr kumimoji="0" lang="da-DK" sz="1200" b="0" i="0" u="none" strike="noStrike" cap="none" normalizeH="0" baseline="0" smtClean="0">
+                        <a:ln>
+                          <a:noFill/>
+                        </a:ln>
+                        <a:solidFill>
+                          <a:schemeClr val="tx1"/>
+                        </a:solidFill>
+                        <a:effectLst/>
+                        <a:latin typeface="Arial" charset="0"/>
+                      </a:endParaRPr>
+                    </a:p>
+                  </a:txBody>
+                  <a:tcPr marL="91406" marR="91406" marT="45703" marB="45703" horzOverflow="overflow">
+                    <a:lnL w="12700" cap="flat" cmpd="sng" algn="ctr">
+                      <a:solidFill>
+                        <a:schemeClr val="tx1"/>
+                      </a:solidFill>
+                      <a:prstDash val="solid"/>
+                      <a:round/>
+                      <a:headEnd type="none" w="sm" len="sm"/>
+                      <a:tailEnd type="none" w="sm" len="sm"/>
+                    </a:lnL>
+                    <a:lnR w="28575" cap="flat" cmpd="sng" algn="ctr">
+                      <a:solidFill>
+                        <a:schemeClr val="tx1"/>
+                      </a:solidFill>
+                      <a:prstDash val="solid"/>
+                      <a:round/>
+                      <a:headEnd type="none" w="sm" len="sm"/>
+                      <a:tailEnd type="none" w="sm" len="sm"/>
+                    </a:lnR>
+                    <a:lnT w="12700" cap="flat" cmpd="sng" algn="ctr">
+                      <a:solidFill>
+                        <a:schemeClr val="tx1"/>
+                      </a:solidFill>
+                      <a:prstDash val="solid"/>
+                      <a:round/>
+                      <a:headEnd type="none" w="sm" len="sm"/>
+                      <a:tailEnd type="none" w="sm" len="sm"/>
+                    </a:lnT>
+                    <a:lnB w="12700" cap="flat" cmpd="sng" algn="ctr">
+                      <a:solidFill>
+                        <a:schemeClr val="tx1"/>
+                      </a:solidFill>
+                      <a:prstDash val="solid"/>
+                      <a:round/>
+                      <a:headEnd type="none" w="sm" len="sm"/>
+                      <a:tailEnd type="none" w="sm" len="sm"/>
+                    </a:lnB>
+                    <a:lnTlToBr>
+                      <a:noFill/>
+                    </a:lnTlToBr>
+                    <a:lnBlToTr>
+                      <a:noFill/>
+                    </a:lnBlToTr>
+                    <a:noFill/>
+                  </a:tcPr>
+                </a:tc>
+              </a:tr>
+              <a:tr h="341186">
+                <a:tc>
+                  <a:txBody>
+                    <a:bodyPr/>
+                    <a:lstStyle/>
+                    <a:p>
+                      <a:pPr marL="0" marR="0" lvl="0" indent="0" algn="l" defTabSz="914400" rtl="0" eaLnBrk="1" fontAlgn="base" latinLnBrk="0" hangingPunct="1">
+                        <a:lnSpc>
+                          <a:spcPct val="100000"/>
+                        </a:lnSpc>
+                        <a:spcBef>
+                          <a:spcPct val="20000"/>
+                        </a:spcBef>
+                        <a:spcAft>
+                          <a:spcPct val="0"/>
+                        </a:spcAft>
+                        <a:buClrTx/>
+                        <a:buSzTx/>
+                        <a:buFontTx/>
+                        <a:buNone/>
+                        <a:tabLst/>
+                      </a:pPr>
+                      <a:r>
+                        <a:rPr kumimoji="0" lang="da-DK" sz="1200" b="0" i="0" u="none" strike="noStrike" cap="none" normalizeH="0" baseline="0" smtClean="0">
+                          <a:ln>
+                            <a:noFill/>
+                          </a:ln>
+                          <a:solidFill>
+                            <a:schemeClr val="tx1"/>
+                          </a:solidFill>
+                          <a:effectLst/>
+                          <a:latin typeface="Arial" charset="0"/>
+                        </a:rPr>
+                        <a:t>4</a:t>
+                      </a:r>
+                    </a:p>
+                  </a:txBody>
+                  <a:tcPr marL="91406" marR="91406" marT="45703" marB="45703" horzOverflow="overflow">
+                    <a:lnL w="28575" cap="flat" cmpd="sng" algn="ctr">
+                      <a:solidFill>
+                        <a:schemeClr val="tx1"/>
+                      </a:solidFill>
+                      <a:prstDash val="solid"/>
+                      <a:round/>
+                      <a:headEnd type="none" w="sm" len="sm"/>
+                      <a:tailEnd type="none" w="sm" len="sm"/>
+                    </a:lnL>
+                    <a:lnR w="12700" cap="flat" cmpd="sng" algn="ctr">
+                      <a:solidFill>
+                        <a:schemeClr val="tx1"/>
+                      </a:solidFill>
+                      <a:prstDash val="solid"/>
+                      <a:round/>
+                      <a:headEnd type="none" w="sm" len="sm"/>
+                      <a:tailEnd type="none" w="sm" len="sm"/>
+                    </a:lnR>
+                    <a:lnT w="12700" cap="flat" cmpd="sng" algn="ctr">
+                      <a:solidFill>
+                        <a:schemeClr val="tx1"/>
+                      </a:solidFill>
+                      <a:prstDash val="solid"/>
+                      <a:round/>
+                      <a:headEnd type="none" w="sm" len="sm"/>
+                      <a:tailEnd type="none" w="sm" len="sm"/>
+                    </a:lnT>
+                    <a:lnB w="12700" cap="flat" cmpd="sng" algn="ctr">
+                      <a:solidFill>
+                        <a:schemeClr val="tx1"/>
+                      </a:solidFill>
+                      <a:prstDash val="solid"/>
+                      <a:round/>
+                      <a:headEnd type="none" w="sm" len="sm"/>
+                      <a:tailEnd type="none" w="sm" len="sm"/>
+                    </a:lnB>
+                    <a:lnTlToBr>
+                      <a:noFill/>
+                    </a:lnTlToBr>
+                    <a:lnBlToTr>
+                      <a:noFill/>
+                    </a:lnBlToTr>
+                    <a:noFill/>
+                  </a:tcPr>
+                </a:tc>
+                <a:tc>
+                  <a:txBody>
+                    <a:bodyPr/>
+                    <a:lstStyle/>
+                    <a:p>
+                      <a:pPr marL="0" marR="0" lvl="0" indent="0" algn="l" defTabSz="914400" rtl="0" eaLnBrk="1" fontAlgn="base" latinLnBrk="0" hangingPunct="1">
+                        <a:lnSpc>
+                          <a:spcPct val="100000"/>
+                        </a:lnSpc>
+                        <a:spcBef>
+                          <a:spcPct val="20000"/>
+                        </a:spcBef>
+                        <a:spcAft>
+                          <a:spcPct val="0"/>
+                        </a:spcAft>
+                        <a:buClrTx/>
+                        <a:buSzTx/>
+                        <a:buFontTx/>
+                        <a:buNone/>
+                        <a:tabLst/>
+                      </a:pPr>
+                      <a:endParaRPr kumimoji="0" lang="da-DK" sz="1200" b="0" i="0" u="none" strike="noStrike" cap="none" normalizeH="0" baseline="0" smtClean="0">
+                        <a:ln>
+                          <a:noFill/>
+                        </a:ln>
+                        <a:solidFill>
+                          <a:schemeClr val="tx1"/>
+                        </a:solidFill>
+                        <a:effectLst/>
+                        <a:latin typeface="Arial" charset="0"/>
+                      </a:endParaRPr>
+                    </a:p>
+                  </a:txBody>
+                  <a:tcPr marL="91406" marR="91406" marT="45703" marB="45703" horzOverflow="overflow">
+                    <a:lnL w="12700" cap="flat" cmpd="sng" algn="ctr">
+                      <a:solidFill>
+                        <a:schemeClr val="tx1"/>
+                      </a:solidFill>
+                      <a:prstDash val="solid"/>
+                      <a:round/>
+                      <a:headEnd type="none" w="sm" len="sm"/>
+                      <a:tailEnd type="none" w="sm" len="sm"/>
+                    </a:lnL>
+                    <a:lnR w="28575" cap="flat" cmpd="sng" algn="ctr">
+                      <a:solidFill>
+                        <a:schemeClr val="tx1"/>
+                      </a:solidFill>
+                      <a:prstDash val="solid"/>
+                      <a:round/>
+                      <a:headEnd type="none" w="sm" len="sm"/>
+                      <a:tailEnd type="none" w="sm" len="sm"/>
+                    </a:lnR>
+                    <a:lnT w="12700" cap="flat" cmpd="sng" algn="ctr">
+                      <a:solidFill>
+                        <a:schemeClr val="tx1"/>
+                      </a:solidFill>
+                      <a:prstDash val="solid"/>
+                      <a:round/>
+                      <a:headEnd type="none" w="sm" len="sm"/>
+                      <a:tailEnd type="none" w="sm" len="sm"/>
+                    </a:lnT>
+                    <a:lnB w="12700" cap="flat" cmpd="sng" algn="ctr">
+                      <a:solidFill>
+                        <a:schemeClr val="tx1"/>
+                      </a:solidFill>
+                      <a:prstDash val="solid"/>
+                      <a:round/>
+                      <a:headEnd type="none" w="sm" len="sm"/>
+                      <a:tailEnd type="none" w="sm" len="sm"/>
+                    </a:lnB>
+                    <a:lnTlToBr>
+                      <a:noFill/>
+                    </a:lnTlToBr>
+                    <a:lnBlToTr>
+                      <a:noFill/>
+                    </a:lnBlToTr>
+                    <a:noFill/>
+                  </a:tcPr>
+                </a:tc>
+              </a:tr>
+              <a:tr h="341186">
+                <a:tc>
+                  <a:txBody>
+                    <a:bodyPr/>
+                    <a:lstStyle/>
+                    <a:p>
+                      <a:pPr marL="0" marR="0" lvl="0" indent="0" algn="l" defTabSz="914400" rtl="0" eaLnBrk="1" fontAlgn="base" latinLnBrk="0" hangingPunct="1">
+                        <a:lnSpc>
+                          <a:spcPct val="100000"/>
+                        </a:lnSpc>
+                        <a:spcBef>
+                          <a:spcPct val="20000"/>
+                        </a:spcBef>
+                        <a:spcAft>
+                          <a:spcPct val="0"/>
+                        </a:spcAft>
+                        <a:buClrTx/>
+                        <a:buSzTx/>
+                        <a:buFontTx/>
+                        <a:buNone/>
+                        <a:tabLst/>
+                      </a:pPr>
+                      <a:r>
+                        <a:rPr kumimoji="0" lang="da-DK" sz="1200" b="0" i="0" u="none" strike="noStrike" cap="none" normalizeH="0" baseline="0" smtClean="0">
+                          <a:ln>
+                            <a:noFill/>
+                          </a:ln>
+                          <a:solidFill>
+                            <a:schemeClr val="tx1"/>
+                          </a:solidFill>
+                          <a:effectLst/>
+                          <a:latin typeface="Arial" charset="0"/>
+                        </a:rPr>
+                        <a:t>5</a:t>
+                      </a:r>
+                    </a:p>
+                  </a:txBody>
+                  <a:tcPr marL="91406" marR="91406" marT="45703" marB="45703" horzOverflow="overflow">
+                    <a:lnL w="28575" cap="flat" cmpd="sng" algn="ctr">
+                      <a:solidFill>
+                        <a:schemeClr val="tx1"/>
+                      </a:solidFill>
+                      <a:prstDash val="solid"/>
+                      <a:round/>
+                      <a:headEnd type="none" w="sm" len="sm"/>
+                      <a:tailEnd type="none" w="sm" len="sm"/>
+                    </a:lnL>
+                    <a:lnR w="12700" cap="flat" cmpd="sng" algn="ctr">
+                      <a:solidFill>
+                        <a:schemeClr val="tx1"/>
+                      </a:solidFill>
+                      <a:prstDash val="solid"/>
+                      <a:round/>
+                      <a:headEnd type="none" w="sm" len="sm"/>
+                      <a:tailEnd type="none" w="sm" len="sm"/>
+                    </a:lnR>
+                    <a:lnT w="12700" cap="flat" cmpd="sng" algn="ctr">
+                      <a:solidFill>
+                        <a:schemeClr val="tx1"/>
+                      </a:solidFill>
+                      <a:prstDash val="solid"/>
+                      <a:round/>
+                      <a:headEnd type="none" w="sm" len="sm"/>
+                      <a:tailEnd type="none" w="sm" len="sm"/>
+                    </a:lnT>
+                    <a:lnB w="12700" cap="flat" cmpd="sng" algn="ctr">
+                      <a:solidFill>
+                        <a:schemeClr val="tx1"/>
+                      </a:solidFill>
+                      <a:prstDash val="solid"/>
+                      <a:round/>
+                      <a:headEnd type="none" w="sm" len="sm"/>
+                      <a:tailEnd type="none" w="sm" len="sm"/>
+                    </a:lnB>
+                    <a:lnTlToBr>
+                      <a:noFill/>
+                    </a:lnTlToBr>
+                    <a:lnBlToTr>
+                      <a:noFill/>
+                    </a:lnBlToTr>
+                    <a:noFill/>
+                  </a:tcPr>
+                </a:tc>
+                <a:tc>
+                  <a:txBody>
+                    <a:bodyPr/>
+                    <a:lstStyle/>
+                    <a:p>
+                      <a:pPr marL="0" marR="0" lvl="0" indent="0" algn="l" defTabSz="914400" rtl="0" eaLnBrk="1" fontAlgn="base" latinLnBrk="0" hangingPunct="1">
+                        <a:lnSpc>
+                          <a:spcPct val="100000"/>
+                        </a:lnSpc>
+                        <a:spcBef>
+                          <a:spcPct val="20000"/>
+                        </a:spcBef>
+                        <a:spcAft>
+                          <a:spcPct val="0"/>
+                        </a:spcAft>
+                        <a:buClrTx/>
+                        <a:buSzTx/>
+                        <a:buFontTx/>
+                        <a:buNone/>
+                        <a:tabLst/>
+                      </a:pPr>
+                      <a:endParaRPr kumimoji="0" lang="da-DK" sz="1200" b="0" i="0" u="none" strike="noStrike" cap="none" normalizeH="0" baseline="0" smtClean="0">
+                        <a:ln>
+                          <a:noFill/>
+                        </a:ln>
+                        <a:solidFill>
+                          <a:schemeClr val="tx1"/>
+                        </a:solidFill>
+                        <a:effectLst/>
+                        <a:latin typeface="Arial" charset="0"/>
+                      </a:endParaRPr>
+                    </a:p>
+                  </a:txBody>
+                  <a:tcPr marL="91406" marR="91406" marT="45703" marB="45703" horzOverflow="overflow">
+                    <a:lnL w="12700" cap="flat" cmpd="sng" algn="ctr">
+                      <a:solidFill>
+                        <a:schemeClr val="tx1"/>
+                      </a:solidFill>
+                      <a:prstDash val="solid"/>
+                      <a:round/>
+                      <a:headEnd type="none" w="sm" len="sm"/>
+                      <a:tailEnd type="none" w="sm" len="sm"/>
+                    </a:lnL>
+                    <a:lnR w="28575" cap="flat" cmpd="sng" algn="ctr">
+                      <a:solidFill>
+                        <a:schemeClr val="tx1"/>
+                      </a:solidFill>
+                      <a:prstDash val="solid"/>
+                      <a:round/>
+                      <a:headEnd type="none" w="sm" len="sm"/>
+                      <a:tailEnd type="none" w="sm" len="sm"/>
+                    </a:lnR>
+                    <a:lnT w="12700" cap="flat" cmpd="sng" algn="ctr">
+                      <a:solidFill>
+                        <a:schemeClr val="tx1"/>
+                      </a:solidFill>
+                      <a:prstDash val="solid"/>
+                      <a:round/>
+                      <a:headEnd type="none" w="sm" len="sm"/>
+                      <a:tailEnd type="none" w="sm" len="sm"/>
+                    </a:lnT>
+                    <a:lnB w="12700" cap="flat" cmpd="sng" algn="ctr">
+                      <a:solidFill>
+                        <a:schemeClr val="tx1"/>
+                      </a:solidFill>
+                      <a:prstDash val="solid"/>
+                      <a:round/>
+                      <a:headEnd type="none" w="sm" len="sm"/>
+                      <a:tailEnd type="none" w="sm" len="sm"/>
+                    </a:lnB>
+                    <a:lnTlToBr>
+                      <a:noFill/>
+                    </a:lnTlToBr>
+                    <a:lnBlToTr>
+                      <a:noFill/>
+                    </a:lnBlToTr>
+                    <a:noFill/>
+                  </a:tcPr>
+                </a:tc>
+              </a:tr>
+              <a:tr h="341186">
+                <a:tc>
+                  <a:txBody>
+                    <a:bodyPr/>
+                    <a:lstStyle/>
+                    <a:p>
+                      <a:pPr marL="0" marR="0" lvl="0" indent="0" algn="l" defTabSz="914400" rtl="0" eaLnBrk="1" fontAlgn="base" latinLnBrk="0" hangingPunct="1">
+                        <a:lnSpc>
+                          <a:spcPct val="100000"/>
+                        </a:lnSpc>
+                        <a:spcBef>
+                          <a:spcPct val="20000"/>
+                        </a:spcBef>
+                        <a:spcAft>
+                          <a:spcPct val="0"/>
+                        </a:spcAft>
+                        <a:buClrTx/>
+                        <a:buSzTx/>
+                        <a:buFontTx/>
+                        <a:buNone/>
+                        <a:tabLst/>
+                      </a:pPr>
+                      <a:r>
+                        <a:rPr kumimoji="0" lang="da-DK" sz="1200" b="0" i="0" u="none" strike="noStrike" cap="none" normalizeH="0" baseline="0" smtClean="0">
+                          <a:ln>
+                            <a:noFill/>
+                          </a:ln>
+                          <a:solidFill>
+                            <a:schemeClr val="tx1"/>
+                          </a:solidFill>
+                          <a:effectLst/>
+                          <a:latin typeface="Arial" charset="0"/>
+                        </a:rPr>
+                        <a:t>6</a:t>
+                      </a:r>
+                    </a:p>
+                  </a:txBody>
+                  <a:tcPr marL="91406" marR="91406" marT="45703" marB="45703" horzOverflow="overflow">
+                    <a:lnL w="28575" cap="flat" cmpd="sng" algn="ctr">
+                      <a:solidFill>
+                        <a:schemeClr val="tx1"/>
+                      </a:solidFill>
+                      <a:prstDash val="solid"/>
+                      <a:round/>
+                      <a:headEnd type="none" w="sm" len="sm"/>
+                      <a:tailEnd type="none" w="sm" len="sm"/>
+                    </a:lnL>
+                    <a:lnR w="12700" cap="flat" cmpd="sng" algn="ctr">
+                      <a:solidFill>
+                        <a:schemeClr val="tx1"/>
+                      </a:solidFill>
+                      <a:prstDash val="solid"/>
+                      <a:round/>
+                      <a:headEnd type="none" w="sm" len="sm"/>
+                      <a:tailEnd type="none" w="sm" len="sm"/>
+                    </a:lnR>
+                    <a:lnT w="12700" cap="flat" cmpd="sng" algn="ctr">
+                      <a:solidFill>
+                        <a:schemeClr val="tx1"/>
+                      </a:solidFill>
+                      <a:prstDash val="solid"/>
+                      <a:round/>
+                      <a:headEnd type="none" w="sm" len="sm"/>
+                      <a:tailEnd type="none" w="sm" len="sm"/>
+                    </a:lnT>
+                    <a:lnB w="12700" cap="flat" cmpd="sng" algn="ctr">
+                      <a:solidFill>
+                        <a:schemeClr val="tx1"/>
+                      </a:solidFill>
+                      <a:prstDash val="solid"/>
+                      <a:round/>
+                      <a:headEnd type="none" w="sm" len="sm"/>
+                      <a:tailEnd type="none" w="sm" len="sm"/>
+                    </a:lnB>
+                    <a:lnTlToBr>
+                      <a:noFill/>
+                    </a:lnTlToBr>
+                    <a:lnBlToTr>
+                      <a:noFill/>
+                    </a:lnBlToTr>
+                    <a:noFill/>
+                  </a:tcPr>
+                </a:tc>
+                <a:tc>
+                  <a:txBody>
+                    <a:bodyPr/>
+                    <a:lstStyle/>
+                    <a:p>
+                      <a:pPr marL="0" marR="0" lvl="0" indent="0" algn="l" defTabSz="914400" rtl="0" eaLnBrk="1" fontAlgn="base" latinLnBrk="0" hangingPunct="1">
+                        <a:lnSpc>
+                          <a:spcPct val="100000"/>
+                        </a:lnSpc>
+                        <a:spcBef>
+                          <a:spcPct val="20000"/>
+                        </a:spcBef>
+                        <a:spcAft>
+                          <a:spcPct val="0"/>
+                        </a:spcAft>
+                        <a:buClrTx/>
+                        <a:buSzTx/>
+                        <a:buFontTx/>
+                        <a:buNone/>
+                        <a:tabLst/>
+                      </a:pPr>
+                      <a:endParaRPr kumimoji="0" lang="da-DK" sz="1200" b="0" i="0" u="none" strike="noStrike" cap="none" normalizeH="0" baseline="0" smtClean="0">
+                        <a:ln>
+                          <a:noFill/>
+                        </a:ln>
+                        <a:solidFill>
+                          <a:schemeClr val="tx1"/>
+                        </a:solidFill>
+                        <a:effectLst/>
+                        <a:latin typeface="Arial" charset="0"/>
+                      </a:endParaRPr>
+                    </a:p>
+                  </a:txBody>
+                  <a:tcPr marL="91406" marR="91406" marT="45703" marB="45703" horzOverflow="overflow">
+                    <a:lnL w="12700" cap="flat" cmpd="sng" algn="ctr">
+                      <a:solidFill>
+                        <a:schemeClr val="tx1"/>
+                      </a:solidFill>
+                      <a:prstDash val="solid"/>
+                      <a:round/>
+                      <a:headEnd type="none" w="sm" len="sm"/>
+                      <a:tailEnd type="none" w="sm" len="sm"/>
+                    </a:lnL>
+                    <a:lnR w="28575" cap="flat" cmpd="sng" algn="ctr">
+                      <a:solidFill>
+                        <a:schemeClr val="tx1"/>
+                      </a:solidFill>
+                      <a:prstDash val="solid"/>
+                      <a:round/>
+                      <a:headEnd type="none" w="sm" len="sm"/>
+                      <a:tailEnd type="none" w="sm" len="sm"/>
+                    </a:lnR>
+                    <a:lnT w="12700" cap="flat" cmpd="sng" algn="ctr">
+                      <a:solidFill>
+                        <a:schemeClr val="tx1"/>
+                      </a:solidFill>
+                      <a:prstDash val="solid"/>
+                      <a:round/>
+                      <a:headEnd type="none" w="sm" len="sm"/>
+                      <a:tailEnd type="none" w="sm" len="sm"/>
+                    </a:lnT>
+                    <a:lnB w="12700" cap="flat" cmpd="sng" algn="ctr">
+                      <a:solidFill>
+                        <a:schemeClr val="tx1"/>
+                      </a:solidFill>
+                      <a:prstDash val="solid"/>
+                      <a:round/>
+                      <a:headEnd type="none" w="sm" len="sm"/>
+                      <a:tailEnd type="none" w="sm" len="sm"/>
+                    </a:lnB>
+                    <a:lnTlToBr>
+                      <a:noFill/>
+                    </a:lnTlToBr>
+                    <a:lnBlToTr>
+                      <a:noFill/>
+                    </a:lnBlToTr>
+                    <a:noFill/>
+                  </a:tcPr>
+                </a:tc>
+              </a:tr>
+              <a:tr h="341186">
+                <a:tc>
+                  <a:txBody>
+                    <a:bodyPr/>
+                    <a:lstStyle/>
+                    <a:p>
+                      <a:pPr marL="0" marR="0" lvl="0" indent="0" algn="l" defTabSz="914400" rtl="0" eaLnBrk="1" fontAlgn="base" latinLnBrk="0" hangingPunct="1">
+                        <a:lnSpc>
+                          <a:spcPct val="100000"/>
+                        </a:lnSpc>
+                        <a:spcBef>
+                          <a:spcPct val="20000"/>
+                        </a:spcBef>
+                        <a:spcAft>
+                          <a:spcPct val="0"/>
+                        </a:spcAft>
+                        <a:buClrTx/>
+                        <a:buSzTx/>
+                        <a:buFontTx/>
+                        <a:buNone/>
+                        <a:tabLst/>
+                      </a:pPr>
+                      <a:r>
+                        <a:rPr kumimoji="0" lang="da-DK" sz="1200" b="0" i="0" u="none" strike="noStrike" cap="none" normalizeH="0" baseline="0" smtClean="0">
+                          <a:ln>
+                            <a:noFill/>
+                          </a:ln>
+                          <a:solidFill>
+                            <a:schemeClr val="tx1"/>
+                          </a:solidFill>
+                          <a:effectLst/>
+                          <a:latin typeface="Arial" charset="0"/>
+                        </a:rPr>
+                        <a:t>7</a:t>
+                      </a:r>
+                    </a:p>
+                  </a:txBody>
+                  <a:tcPr marL="91406" marR="91406" marT="45703" marB="45703" horzOverflow="overflow">
+                    <a:lnL w="28575" cap="flat" cmpd="sng" algn="ctr">
+                      <a:solidFill>
+                        <a:schemeClr val="tx1"/>
+                      </a:solidFill>
+                      <a:prstDash val="solid"/>
+                      <a:round/>
+                      <a:headEnd type="none" w="sm" len="sm"/>
+                      <a:tailEnd type="none" w="sm" len="sm"/>
+                    </a:lnL>
+                    <a:lnR w="12700" cap="flat" cmpd="sng" algn="ctr">
+                      <a:solidFill>
+                        <a:schemeClr val="tx1"/>
+                      </a:solidFill>
+                      <a:prstDash val="solid"/>
+                      <a:round/>
+                      <a:headEnd type="none" w="sm" len="sm"/>
+                      <a:tailEnd type="none" w="sm" len="sm"/>
+                    </a:lnR>
+                    <a:lnT w="12700" cap="flat" cmpd="sng" algn="ctr">
+                      <a:solidFill>
+                        <a:schemeClr val="tx1"/>
+                      </a:solidFill>
+                      <a:prstDash val="solid"/>
+                      <a:round/>
+                      <a:headEnd type="none" w="sm" len="sm"/>
+                      <a:tailEnd type="none" w="sm" len="sm"/>
+                    </a:lnT>
+                    <a:lnB w="12700" cap="flat" cmpd="sng" algn="ctr">
+                      <a:solidFill>
+                        <a:schemeClr val="tx1"/>
+                      </a:solidFill>
+                      <a:prstDash val="solid"/>
+                      <a:round/>
+                      <a:headEnd type="none" w="sm" len="sm"/>
+                      <a:tailEnd type="none" w="sm" len="sm"/>
+                    </a:lnB>
+                    <a:lnTlToBr>
+                      <a:noFill/>
+                    </a:lnTlToBr>
+                    <a:lnBlToTr>
+                      <a:noFill/>
+                    </a:lnBlToTr>
+                    <a:noFill/>
+                  </a:tcPr>
+                </a:tc>
+                <a:tc>
+                  <a:txBody>
+                    <a:bodyPr/>
+                    <a:lstStyle/>
+                    <a:p>
+                      <a:pPr marL="0" marR="0" lvl="0" indent="0" algn="l" defTabSz="914400" rtl="0" eaLnBrk="1" fontAlgn="base" latinLnBrk="0" hangingPunct="1">
+                        <a:lnSpc>
+                          <a:spcPct val="100000"/>
+                        </a:lnSpc>
+                        <a:spcBef>
+                          <a:spcPct val="20000"/>
+                        </a:spcBef>
+                        <a:spcAft>
+                          <a:spcPct val="0"/>
+                        </a:spcAft>
+                        <a:buClrTx/>
+                        <a:buSzTx/>
+                        <a:buFontTx/>
+                        <a:buNone/>
+                        <a:tabLst/>
+                      </a:pPr>
+                      <a:endParaRPr kumimoji="0" lang="da-DK" sz="1200" b="0" i="0" u="none" strike="noStrike" cap="none" normalizeH="0" baseline="0" smtClean="0">
+                        <a:ln>
+                          <a:noFill/>
+                        </a:ln>
+                        <a:solidFill>
+                          <a:schemeClr val="tx1"/>
+                        </a:solidFill>
+                        <a:effectLst/>
+                        <a:latin typeface="Arial" charset="0"/>
+                      </a:endParaRPr>
+                    </a:p>
+                  </a:txBody>
+                  <a:tcPr marL="91406" marR="91406" marT="45703" marB="45703" horzOverflow="overflow">
+                    <a:lnL w="12700" cap="flat" cmpd="sng" algn="ctr">
+                      <a:solidFill>
+                        <a:schemeClr val="tx1"/>
+                      </a:solidFill>
+                      <a:prstDash val="solid"/>
+                      <a:round/>
+                      <a:headEnd type="none" w="sm" len="sm"/>
+                      <a:tailEnd type="none" w="sm" len="sm"/>
+                    </a:lnL>
+                    <a:lnR w="28575" cap="flat" cmpd="sng" algn="ctr">
+                      <a:solidFill>
+                        <a:schemeClr val="tx1"/>
+                      </a:solidFill>
+                      <a:prstDash val="solid"/>
+                      <a:round/>
+                      <a:headEnd type="none" w="sm" len="sm"/>
+                      <a:tailEnd type="none" w="sm" len="sm"/>
+                    </a:lnR>
+                    <a:lnT w="12700" cap="flat" cmpd="sng" algn="ctr">
+                      <a:solidFill>
+                        <a:schemeClr val="tx1"/>
+                      </a:solidFill>
+                      <a:prstDash val="solid"/>
+                      <a:round/>
+                      <a:headEnd type="none" w="sm" len="sm"/>
+                      <a:tailEnd type="none" w="sm" len="sm"/>
+                    </a:lnT>
+                    <a:lnB w="12700" cap="flat" cmpd="sng" algn="ctr">
+                      <a:solidFill>
+                        <a:schemeClr val="tx1"/>
+                      </a:solidFill>
+                      <a:prstDash val="solid"/>
+                      <a:round/>
+                      <a:headEnd type="none" w="sm" len="sm"/>
+                      <a:tailEnd type="none" w="sm" len="sm"/>
+                    </a:lnB>
+                    <a:lnTlToBr>
+                      <a:noFill/>
+                    </a:lnTlToBr>
+                    <a:lnBlToTr>
+                      <a:noFill/>
+                    </a:lnBlToTr>
+                    <a:noFill/>
+                  </a:tcPr>
+                </a:tc>
+              </a:tr>
+              <a:tr h="339598">
+                <a:tc>
+                  <a:txBody>
+                    <a:bodyPr/>
+                    <a:lstStyle/>
+                    <a:p>
+                      <a:pPr marL="0" marR="0" lvl="0" indent="0" algn="l" defTabSz="914400" rtl="0" eaLnBrk="1" fontAlgn="base" latinLnBrk="0" hangingPunct="1">
+                        <a:lnSpc>
+                          <a:spcPct val="100000"/>
+                        </a:lnSpc>
+                        <a:spcBef>
+                          <a:spcPct val="20000"/>
+                        </a:spcBef>
+                        <a:spcAft>
+                          <a:spcPct val="0"/>
+                        </a:spcAft>
+                        <a:buClrTx/>
+                        <a:buSzTx/>
+                        <a:buFontTx/>
+                        <a:buNone/>
+                        <a:tabLst/>
+                      </a:pPr>
+                      <a:r>
+                        <a:rPr kumimoji="0" lang="da-DK" sz="1200" b="0" i="0" u="none" strike="noStrike" cap="none" normalizeH="0" baseline="0" smtClean="0">
+                          <a:ln>
+                            <a:noFill/>
+                          </a:ln>
+                          <a:solidFill>
+                            <a:schemeClr val="tx1"/>
+                          </a:solidFill>
+                          <a:effectLst/>
+                          <a:latin typeface="Arial" charset="0"/>
+                        </a:rPr>
+                        <a:t>8</a:t>
+                      </a:r>
+                    </a:p>
+                  </a:txBody>
+                  <a:tcPr marL="91406" marR="91406" marT="45703" marB="45703" horzOverflow="overflow">
+                    <a:lnL w="28575" cap="flat" cmpd="sng" algn="ctr">
+                      <a:solidFill>
+                        <a:schemeClr val="tx1"/>
+                      </a:solidFill>
+                      <a:prstDash val="solid"/>
+                      <a:round/>
+                      <a:headEnd type="none" w="sm" len="sm"/>
+                      <a:tailEnd type="none" w="sm" len="sm"/>
+                    </a:lnL>
+                    <a:lnR w="12700" cap="flat" cmpd="sng" algn="ctr">
+                      <a:solidFill>
+                        <a:schemeClr val="tx1"/>
+                      </a:solidFill>
+                      <a:prstDash val="solid"/>
+                      <a:round/>
+                      <a:headEnd type="none" w="sm" len="sm"/>
+                      <a:tailEnd type="none" w="sm" len="sm"/>
+                    </a:lnR>
+                    <a:lnT w="12700" cap="flat" cmpd="sng" algn="ctr">
+                      <a:solidFill>
+                        <a:schemeClr val="tx1"/>
+                      </a:solidFill>
+                      <a:prstDash val="solid"/>
+                      <a:round/>
+                      <a:headEnd type="none" w="sm" len="sm"/>
+                      <a:tailEnd type="none" w="sm" len="sm"/>
+                    </a:lnT>
+                    <a:lnB w="12700" cap="flat" cmpd="sng" algn="ctr">
+                      <a:solidFill>
+                        <a:schemeClr val="tx1"/>
+                      </a:solidFill>
+                      <a:prstDash val="solid"/>
+                      <a:round/>
+                      <a:headEnd type="none" w="sm" len="sm"/>
+                      <a:tailEnd type="none" w="sm" len="sm"/>
+                    </a:lnB>
+                    <a:lnTlToBr>
+                      <a:noFill/>
+                    </a:lnTlToBr>
+                    <a:lnBlToTr>
+                      <a:noFill/>
+                    </a:lnBlToTr>
+                    <a:noFill/>
+                  </a:tcPr>
+                </a:tc>
+                <a:tc>
+                  <a:txBody>
+                    <a:bodyPr/>
+                    <a:lstStyle/>
+                    <a:p>
+                      <a:pPr marL="0" marR="0" lvl="0" indent="0" algn="l" defTabSz="914400" rtl="0" eaLnBrk="1" fontAlgn="base" latinLnBrk="0" hangingPunct="1">
+                        <a:lnSpc>
+                          <a:spcPct val="100000"/>
+                        </a:lnSpc>
+                        <a:spcBef>
+                          <a:spcPct val="20000"/>
+                        </a:spcBef>
+                        <a:spcAft>
+                          <a:spcPct val="0"/>
+                        </a:spcAft>
+                        <a:buClrTx/>
+                        <a:buSzTx/>
+                        <a:buFontTx/>
+                        <a:buNone/>
+                        <a:tabLst/>
+                      </a:pPr>
+                      <a:r>
+                        <a:rPr kumimoji="0" lang="da-DK" sz="1200" b="0" i="0" u="none" strike="noStrike" cap="none" normalizeH="0" baseline="0" smtClean="0">
+                          <a:ln>
+                            <a:noFill/>
+                          </a:ln>
+                          <a:solidFill>
+                            <a:schemeClr val="tx1"/>
+                          </a:solidFill>
+                          <a:effectLst/>
+                          <a:latin typeface="Arial" charset="0"/>
+                        </a:rPr>
+                        <a:t>30</a:t>
+                      </a:r>
+                    </a:p>
+                  </a:txBody>
+                  <a:tcPr marL="91406" marR="91406" marT="45703" marB="45703" horzOverflow="overflow">
+                    <a:lnL w="12700" cap="flat" cmpd="sng" algn="ctr">
+                      <a:solidFill>
+                        <a:schemeClr val="tx1"/>
+                      </a:solidFill>
+                      <a:prstDash val="solid"/>
+                      <a:round/>
+                      <a:headEnd type="none" w="sm" len="sm"/>
+                      <a:tailEnd type="none" w="sm" len="sm"/>
+                    </a:lnL>
+                    <a:lnR w="28575" cap="flat" cmpd="sng" algn="ctr">
+                      <a:solidFill>
+                        <a:schemeClr val="tx1"/>
+                      </a:solidFill>
+                      <a:prstDash val="solid"/>
+                      <a:round/>
+                      <a:headEnd type="none" w="sm" len="sm"/>
+                      <a:tailEnd type="none" w="sm" len="sm"/>
+                    </a:lnR>
+                    <a:lnT w="12700" cap="flat" cmpd="sng" algn="ctr">
+                      <a:solidFill>
+                        <a:schemeClr val="tx1"/>
+                      </a:solidFill>
+                      <a:prstDash val="solid"/>
+                      <a:round/>
+                      <a:headEnd type="none" w="sm" len="sm"/>
+                      <a:tailEnd type="none" w="sm" len="sm"/>
+                    </a:lnT>
+                    <a:lnB w="12700" cap="flat" cmpd="sng" algn="ctr">
+                      <a:solidFill>
+                        <a:schemeClr val="tx1"/>
+                      </a:solidFill>
+                      <a:prstDash val="solid"/>
+                      <a:round/>
+                      <a:headEnd type="none" w="sm" len="sm"/>
+                      <a:tailEnd type="none" w="sm" len="sm"/>
+                    </a:lnB>
+                    <a:lnTlToBr>
+                      <a:noFill/>
+                    </a:lnTlToBr>
+                    <a:lnBlToTr>
+                      <a:noFill/>
+                    </a:lnBlToTr>
+                    <a:noFill/>
+                  </a:tcPr>
+                </a:tc>
+              </a:tr>
+              <a:tr h="341186">
+                <a:tc>
+                  <a:txBody>
+                    <a:bodyPr/>
+                    <a:lstStyle/>
+                    <a:p>
+                      <a:pPr marL="0" marR="0" lvl="0" indent="0" algn="l" defTabSz="914400" rtl="0" eaLnBrk="1" fontAlgn="base" latinLnBrk="0" hangingPunct="1">
+                        <a:lnSpc>
+                          <a:spcPct val="100000"/>
+                        </a:lnSpc>
+                        <a:spcBef>
+                          <a:spcPct val="20000"/>
+                        </a:spcBef>
+                        <a:spcAft>
+                          <a:spcPct val="0"/>
+                        </a:spcAft>
+                        <a:buClrTx/>
+                        <a:buSzTx/>
+                        <a:buFontTx/>
+                        <a:buNone/>
+                        <a:tabLst/>
+                      </a:pPr>
+                      <a:r>
+                        <a:rPr kumimoji="0" lang="da-DK" sz="1200" b="0" i="0" u="none" strike="noStrike" cap="none" normalizeH="0" baseline="0" smtClean="0">
+                          <a:ln>
+                            <a:noFill/>
+                          </a:ln>
+                          <a:solidFill>
+                            <a:schemeClr val="tx1"/>
+                          </a:solidFill>
+                          <a:effectLst/>
+                          <a:latin typeface="Arial" charset="0"/>
+                        </a:rPr>
+                        <a:t>9</a:t>
+                      </a:r>
+                    </a:p>
+                  </a:txBody>
+                  <a:tcPr marL="91406" marR="91406" marT="45703" marB="45703" horzOverflow="overflow">
+                    <a:lnL w="28575" cap="flat" cmpd="sng" algn="ctr">
+                      <a:solidFill>
+                        <a:schemeClr val="tx1"/>
+                      </a:solidFill>
+                      <a:prstDash val="solid"/>
+                      <a:round/>
+                      <a:headEnd type="none" w="sm" len="sm"/>
+                      <a:tailEnd type="none" w="sm" len="sm"/>
+                    </a:lnL>
+                    <a:lnR w="12700" cap="flat" cmpd="sng" algn="ctr">
+                      <a:solidFill>
+                        <a:schemeClr val="tx1"/>
+                      </a:solidFill>
+                      <a:prstDash val="solid"/>
+                      <a:round/>
+                      <a:headEnd type="none" w="sm" len="sm"/>
+                      <a:tailEnd type="none" w="sm" len="sm"/>
+                    </a:lnR>
+                    <a:lnT w="12700" cap="flat" cmpd="sng" algn="ctr">
+                      <a:solidFill>
+                        <a:schemeClr val="tx1"/>
+                      </a:solidFill>
+                      <a:prstDash val="solid"/>
+                      <a:round/>
+                      <a:headEnd type="none" w="sm" len="sm"/>
+                      <a:tailEnd type="none" w="sm" len="sm"/>
+                    </a:lnT>
+                    <a:lnB w="12700" cap="flat" cmpd="sng" algn="ctr">
+                      <a:solidFill>
+                        <a:schemeClr val="tx1"/>
+                      </a:solidFill>
+                      <a:prstDash val="solid"/>
+                      <a:round/>
+                      <a:headEnd type="none" w="sm" len="sm"/>
+                      <a:tailEnd type="none" w="sm" len="sm"/>
+                    </a:lnB>
+                    <a:lnTlToBr>
+                      <a:noFill/>
+                    </a:lnTlToBr>
+                    <a:lnBlToTr>
+                      <a:noFill/>
+                    </a:lnBlToTr>
+                    <a:noFill/>
+                  </a:tcPr>
+                </a:tc>
+                <a:tc>
+                  <a:txBody>
+                    <a:bodyPr/>
+                    <a:lstStyle/>
+                    <a:p>
+                      <a:pPr marL="0" marR="0" lvl="0" indent="0" algn="l" defTabSz="914400" rtl="0" eaLnBrk="1" fontAlgn="base" latinLnBrk="0" hangingPunct="1">
+                        <a:lnSpc>
+                          <a:spcPct val="100000"/>
+                        </a:lnSpc>
+                        <a:spcBef>
+                          <a:spcPct val="20000"/>
+                        </a:spcBef>
+                        <a:spcAft>
+                          <a:spcPct val="0"/>
+                        </a:spcAft>
+                        <a:buClrTx/>
+                        <a:buSzTx/>
+                        <a:buFontTx/>
+                        <a:buNone/>
+                        <a:tabLst/>
+                      </a:pPr>
+                      <a:endParaRPr kumimoji="0" lang="da-DK" sz="1200" b="0" i="0" u="none" strike="noStrike" cap="none" normalizeH="0" baseline="0" smtClean="0">
+                        <a:ln>
+                          <a:noFill/>
+                        </a:ln>
+                        <a:solidFill>
+                          <a:schemeClr val="tx1"/>
+                        </a:solidFill>
+                        <a:effectLst/>
+                        <a:latin typeface="Arial" charset="0"/>
+                      </a:endParaRPr>
+                    </a:p>
+                  </a:txBody>
+                  <a:tcPr marL="91406" marR="91406" marT="45703" marB="45703" horzOverflow="overflow">
+                    <a:lnL w="12700" cap="flat" cmpd="sng" algn="ctr">
+                      <a:solidFill>
+                        <a:schemeClr val="tx1"/>
+                      </a:solidFill>
+                      <a:prstDash val="solid"/>
+                      <a:round/>
+                      <a:headEnd type="none" w="sm" len="sm"/>
+                      <a:tailEnd type="none" w="sm" len="sm"/>
+                    </a:lnL>
+                    <a:lnR w="28575" cap="flat" cmpd="sng" algn="ctr">
+                      <a:solidFill>
+                        <a:schemeClr val="tx1"/>
+                      </a:solidFill>
+                      <a:prstDash val="solid"/>
+                      <a:round/>
+                      <a:headEnd type="none" w="sm" len="sm"/>
+                      <a:tailEnd type="none" w="sm" len="sm"/>
+                    </a:lnR>
+                    <a:lnT w="12700" cap="flat" cmpd="sng" algn="ctr">
+                      <a:solidFill>
+                        <a:schemeClr val="tx1"/>
+                      </a:solidFill>
+                      <a:prstDash val="solid"/>
+                      <a:round/>
+                      <a:headEnd type="none" w="sm" len="sm"/>
+                      <a:tailEnd type="none" w="sm" len="sm"/>
+                    </a:lnT>
+                    <a:lnB w="12700" cap="flat" cmpd="sng" algn="ctr">
+                      <a:solidFill>
+                        <a:schemeClr val="tx1"/>
+                      </a:solidFill>
+                      <a:prstDash val="solid"/>
+                      <a:round/>
+                      <a:headEnd type="none" w="sm" len="sm"/>
+                      <a:tailEnd type="none" w="sm" len="sm"/>
+                    </a:lnB>
+                    <a:lnTlToBr>
+                      <a:noFill/>
+                    </a:lnTlToBr>
+                    <a:lnBlToTr>
+                      <a:noFill/>
+                    </a:lnBlToTr>
+                    <a:noFill/>
+                  </a:tcPr>
+                </a:tc>
+              </a:tr>
+              <a:tr h="341186">
+                <a:tc>
+                  <a:txBody>
+                    <a:bodyPr/>
+                    <a:lstStyle/>
+                    <a:p>
+                      <a:pPr marL="0" marR="0" lvl="0" indent="0" algn="l" defTabSz="914400" rtl="0" eaLnBrk="1" fontAlgn="base" latinLnBrk="0" hangingPunct="1">
+                        <a:lnSpc>
+                          <a:spcPct val="100000"/>
+                        </a:lnSpc>
+                        <a:spcBef>
+                          <a:spcPct val="20000"/>
+                        </a:spcBef>
+                        <a:spcAft>
+                          <a:spcPct val="0"/>
+                        </a:spcAft>
+                        <a:buClrTx/>
+                        <a:buSzTx/>
+                        <a:buFontTx/>
+                        <a:buNone/>
+                        <a:tabLst/>
+                      </a:pPr>
+                      <a:r>
+                        <a:rPr kumimoji="0" lang="da-DK" sz="1200" b="0" i="0" u="none" strike="noStrike" cap="none" normalizeH="0" baseline="0" smtClean="0">
+                          <a:ln>
+                            <a:noFill/>
+                          </a:ln>
+                          <a:solidFill>
+                            <a:schemeClr val="tx1"/>
+                          </a:solidFill>
+                          <a:effectLst/>
+                          <a:latin typeface="Arial" charset="0"/>
+                        </a:rPr>
+                        <a:t>10</a:t>
+                      </a:r>
+                    </a:p>
+                  </a:txBody>
+                  <a:tcPr marL="91406" marR="91406" marT="45703" marB="45703" horzOverflow="overflow">
+                    <a:lnL w="28575" cap="flat" cmpd="sng" algn="ctr">
+                      <a:solidFill>
+                        <a:schemeClr val="tx1"/>
+                      </a:solidFill>
+                      <a:prstDash val="solid"/>
+                      <a:round/>
+                      <a:headEnd type="none" w="sm" len="sm"/>
+                      <a:tailEnd type="none" w="sm" len="sm"/>
+                    </a:lnL>
+                    <a:lnR w="12700" cap="flat" cmpd="sng" algn="ctr">
+                      <a:solidFill>
+                        <a:schemeClr val="tx1"/>
+                      </a:solidFill>
+                      <a:prstDash val="solid"/>
+                      <a:round/>
+                      <a:headEnd type="none" w="sm" len="sm"/>
+                      <a:tailEnd type="none" w="sm" len="sm"/>
+                    </a:lnR>
+                    <a:lnT w="12700" cap="flat" cmpd="sng" algn="ctr">
+                      <a:solidFill>
+                        <a:schemeClr val="tx1"/>
+                      </a:solidFill>
+                      <a:prstDash val="solid"/>
+                      <a:round/>
+                      <a:headEnd type="none" w="sm" len="sm"/>
+                      <a:tailEnd type="none" w="sm" len="sm"/>
+                    </a:lnT>
+                    <a:lnB w="28575" cap="flat" cmpd="sng" algn="ctr">
+                      <a:solidFill>
+                        <a:schemeClr val="tx1"/>
+                      </a:solidFill>
+                      <a:prstDash val="solid"/>
+                      <a:round/>
+                      <a:headEnd type="none" w="sm" len="sm"/>
+                      <a:tailEnd type="none" w="sm" len="sm"/>
+                    </a:lnB>
+                    <a:lnTlToBr>
+                      <a:noFill/>
+                    </a:lnTlToBr>
+                    <a:lnBlToTr>
+                      <a:noFill/>
+                    </a:lnBlToTr>
+                    <a:noFill/>
+                  </a:tcPr>
+                </a:tc>
+                <a:tc>
+                  <a:txBody>
+                    <a:bodyPr/>
+                    <a:lstStyle/>
+                    <a:p>
+                      <a:pPr marL="0" marR="0" lvl="0" indent="0" algn="l" defTabSz="914400" rtl="0" eaLnBrk="1" fontAlgn="base" latinLnBrk="0" hangingPunct="1">
+                        <a:lnSpc>
+                          <a:spcPct val="100000"/>
+                        </a:lnSpc>
+                        <a:spcBef>
+                          <a:spcPct val="20000"/>
+                        </a:spcBef>
+                        <a:spcAft>
+                          <a:spcPct val="0"/>
+                        </a:spcAft>
+                        <a:buClrTx/>
+                        <a:buSzTx/>
+                        <a:buFontTx/>
+                        <a:buNone/>
+                        <a:tabLst/>
+                      </a:pPr>
+                      <a:r>
+                        <a:rPr kumimoji="0" lang="da-DK" sz="1200" b="0" i="0" u="none" strike="noStrike" cap="none" normalizeH="0" baseline="0" dirty="0" smtClean="0">
+                          <a:ln>
+                            <a:noFill/>
+                          </a:ln>
+                          <a:solidFill>
+                            <a:schemeClr val="tx1"/>
+                          </a:solidFill>
+                          <a:effectLst/>
+                          <a:latin typeface="Arial" charset="0"/>
+                        </a:rPr>
+                        <a:t>10</a:t>
+                      </a:r>
+                    </a:p>
+                  </a:txBody>
+                  <a:tcPr marL="91406" marR="91406" marT="45703" marB="45703" horzOverflow="overflow">
+                    <a:lnL w="12700" cap="flat" cmpd="sng" algn="ctr">
+                      <a:solidFill>
+                        <a:schemeClr val="tx1"/>
+                      </a:solidFill>
+                      <a:prstDash val="solid"/>
+                      <a:round/>
+                      <a:headEnd type="none" w="sm" len="sm"/>
+                      <a:tailEnd type="none" w="sm" len="sm"/>
+                    </a:lnL>
+                    <a:lnR w="28575" cap="flat" cmpd="sng" algn="ctr">
+                      <a:solidFill>
+                        <a:schemeClr val="tx1"/>
+                      </a:solidFill>
+                      <a:prstDash val="solid"/>
+                      <a:round/>
+                      <a:headEnd type="none" w="sm" len="sm"/>
+                      <a:tailEnd type="none" w="sm" len="sm"/>
+                    </a:lnR>
+                    <a:lnT w="12700" cap="flat" cmpd="sng" algn="ctr">
+                      <a:solidFill>
+                        <a:schemeClr val="tx1"/>
+                      </a:solidFill>
+                      <a:prstDash val="solid"/>
+                      <a:round/>
+                      <a:headEnd type="none" w="sm" len="sm"/>
+                      <a:tailEnd type="none" w="sm" len="sm"/>
+                    </a:lnT>
+                    <a:lnB w="28575" cap="flat" cmpd="sng" algn="ctr">
+                      <a:solidFill>
+                        <a:schemeClr val="tx1"/>
+                      </a:solidFill>
+                      <a:prstDash val="solid"/>
+                      <a:round/>
+                      <a:headEnd type="none" w="sm" len="sm"/>
+                      <a:tailEnd type="none" w="sm" len="sm"/>
+                    </a:lnB>
+                    <a:lnTlToBr>
+                      <a:noFill/>
+                    </a:lnTlToBr>
+                    <a:lnBlToTr>
+                      <a:noFill/>
+                    </a:lnBlToTr>
+                    <a:noFill/>
+                  </a:tcPr>
+                </a:tc>
+              </a:tr>
+            </a:tbl>
+          </a:graphicData>
+        </a:graphic>
+      </p:graphicFrame>
+      <p:sp>
+        <p:nvSpPr>
+          <p:cNvPr id="35879" name="Text Box 64"/>
+          <p:cNvSpPr txBox="1">
+            <a:spLocks noChangeArrowheads="1"/>
+          </p:cNvSpPr>
+          <p:nvPr/>
+        </p:nvSpPr>
+        <p:spPr bwMode="auto">
+          <a:xfrm>
+            <a:off x="469842" y="477351"/>
+            <a:ext cx="5541484" cy="4153573"/>
+          </a:xfrm>
+          <a:prstGeom prst="rect">
+            <a:avLst/>
+          </a:prstGeom>
+          <a:noFill/>
+          <a:ln w="9525">
+            <a:noFill/>
+            <a:miter lim="800000"/>
+            <a:headEnd/>
+            <a:tailEnd/>
+          </a:ln>
+        </p:spPr>
+        <p:txBody>
+          <a:bodyPr>
+            <a:spAutoFit/>
+          </a:bodyPr>
+          <a:lstStyle/>
+          <a:p>
+            <a:pPr>
+              <a:spcBef>
+                <a:spcPct val="50000"/>
+              </a:spcBef>
+            </a:pPr>
+            <a:r>
+              <a:rPr lang="da-DK" sz="2399" b="1" dirty="0"/>
+              <a:t>Hash </a:t>
+            </a:r>
+            <a:r>
+              <a:rPr lang="da-DK" sz="2399" b="1" dirty="0" err="1"/>
+              <a:t>function</a:t>
+            </a:r>
+            <a:r>
+              <a:rPr lang="da-DK" sz="2399" dirty="0"/>
+              <a:t> (ex): </a:t>
+            </a:r>
+          </a:p>
+          <a:p>
+            <a:pPr>
+              <a:spcBef>
+                <a:spcPct val="50000"/>
+              </a:spcBef>
+            </a:pPr>
+            <a:r>
+              <a:rPr lang="da-DK" sz="2399" dirty="0" err="1"/>
+              <a:t>key</a:t>
+            </a:r>
+            <a:r>
+              <a:rPr lang="da-DK" sz="2399" dirty="0"/>
+              <a:t> </a:t>
+            </a:r>
+            <a:r>
+              <a:rPr lang="da-DK" sz="2399" dirty="0" err="1"/>
+              <a:t>value</a:t>
+            </a:r>
+            <a:r>
+              <a:rPr lang="da-DK" sz="2399" dirty="0"/>
+              <a:t> </a:t>
+            </a:r>
+            <a:r>
+              <a:rPr lang="da-DK" sz="2399" dirty="0" err="1"/>
+              <a:t>modulo</a:t>
+            </a:r>
+            <a:r>
+              <a:rPr lang="da-DK" sz="2399" dirty="0"/>
+              <a:t> 11 </a:t>
+            </a:r>
+          </a:p>
+          <a:p>
+            <a:pPr>
+              <a:spcBef>
+                <a:spcPct val="50000"/>
+              </a:spcBef>
+            </a:pPr>
+            <a:r>
+              <a:rPr lang="da-DK" sz="2399" dirty="0"/>
+              <a:t>(11 = </a:t>
+            </a:r>
+            <a:r>
+              <a:rPr lang="da-DK" sz="2399" dirty="0" err="1"/>
+              <a:t>size</a:t>
+            </a:r>
+            <a:r>
+              <a:rPr lang="da-DK" sz="2399" dirty="0"/>
+              <a:t> of </a:t>
+            </a:r>
+            <a:r>
+              <a:rPr lang="da-DK" sz="2399" dirty="0" err="1"/>
+              <a:t>table</a:t>
+            </a:r>
+            <a:r>
+              <a:rPr lang="da-DK" sz="2399" dirty="0"/>
+              <a:t>)</a:t>
+            </a:r>
+          </a:p>
+          <a:p>
+            <a:pPr>
+              <a:spcBef>
+                <a:spcPct val="50000"/>
+              </a:spcBef>
+            </a:pPr>
+            <a:endParaRPr lang="da-DK" sz="2399" dirty="0"/>
+          </a:p>
+          <a:p>
+            <a:pPr>
+              <a:spcBef>
+                <a:spcPct val="50000"/>
+              </a:spcBef>
+            </a:pPr>
+            <a:r>
+              <a:rPr lang="da-DK" sz="2399" dirty="0"/>
+              <a:t>ex: </a:t>
+            </a:r>
+          </a:p>
+          <a:p>
+            <a:pPr>
+              <a:spcBef>
+                <a:spcPct val="50000"/>
+              </a:spcBef>
+            </a:pPr>
+            <a:r>
+              <a:rPr lang="da-DK" sz="2399" dirty="0" err="1"/>
+              <a:t>Key</a:t>
+            </a:r>
+            <a:r>
+              <a:rPr lang="da-DK" sz="2399" dirty="0"/>
+              <a:t> </a:t>
+            </a:r>
+            <a:r>
+              <a:rPr lang="da-DK" sz="2399" dirty="0" err="1"/>
+              <a:t>value</a:t>
+            </a:r>
+            <a:r>
+              <a:rPr lang="da-DK" sz="2399" dirty="0"/>
+              <a:t>: 13</a:t>
+            </a:r>
+          </a:p>
+          <a:p>
+            <a:pPr>
+              <a:spcBef>
+                <a:spcPct val="50000"/>
+              </a:spcBef>
+            </a:pPr>
+            <a:r>
+              <a:rPr lang="da-DK" sz="2399" dirty="0">
+                <a:sym typeface="Wingdings"/>
+              </a:rPr>
+              <a:t/>
+            </a:r>
+            <a:br>
+              <a:rPr lang="da-DK" sz="2399" dirty="0">
+                <a:sym typeface="Wingdings"/>
+              </a:rPr>
+            </a:br>
+            <a:r>
+              <a:rPr lang="da-DK" sz="2399" dirty="0">
+                <a:sym typeface="Wingdings"/>
+              </a:rPr>
+              <a:t>hash (13) =&gt;  13 mod 11 =&gt;  2</a:t>
+            </a:r>
+            <a:endParaRPr lang="da-DK" sz="2399" dirty="0"/>
+          </a:p>
+        </p:txBody>
+      </p:sp>
+    </p:spTree>
+    <p:extLst>
+      <p:ext uri="{BB962C8B-B14F-4D97-AF65-F5344CB8AC3E}">
+        <p14:creationId xmlns:p14="http://schemas.microsoft.com/office/powerpoint/2010/main" val="171858531"/>
+      </p:ext>
+    </p:extLst>
+  </p:cSld>
+  <p:clrMapOvr>
+    <a:masterClrMapping/>
+  </p:clrMapOvr>
+  <p:timing>
+    <p:tnLst>
+      <p:par>
+        <p:cTn id="1" dur="indefinite" restart="never" nodeType="tmRoot"/>
+      </p:par>
+    </p:tnLst>
+  </p:timing>
+</p:sld>
+</file>
+
+<file path=ppt/slides/slide4.xml><?xml version="1.0" encoding="utf-8"?>
+<p:sld xmlns:a="http://schemas.openxmlformats.org/drawingml/2006/main" xmlns:r="http://schemas.openxmlformats.org/officeDocument/2006/relationships" xmlns:p="http://schemas.openxmlformats.org/presentationml/2006/main">
+  <p:cSld>
+    <p:spTree>
+      <p:nvGrpSpPr>
+        <p:cNvPr id="1" name=""/>
+        <p:cNvGrpSpPr/>
+        <p:nvPr/>
+      </p:nvGrpSpPr>
+      <p:grpSpPr>
+        <a:xfrm>
+          <a:off x="0" y="0"/>
+          <a:ext cx="0" cy="0"/>
+          <a:chOff x="0" y="0"/>
+          <a:chExt cx="0" cy="0"/>
+        </a:xfrm>
+      </p:grpSpPr>
+      <p:sp>
+        <p:nvSpPr>
+          <p:cNvPr id="33793" name="Titel 1"/>
+          <p:cNvSpPr>
+            <a:spLocks noGrp="1"/>
+          </p:cNvSpPr>
+          <p:nvPr>
+            <p:ph type="title"/>
+          </p:nvPr>
+        </p:nvSpPr>
+        <p:spPr/>
+        <p:txBody>
+          <a:bodyPr/>
+          <a:lstStyle/>
+          <a:p>
+            <a:r>
+              <a:rPr lang="da-DK" dirty="0" err="1" smtClean="0"/>
+              <a:t>Collisions</a:t>
+            </a:r>
+            <a:r>
+              <a:rPr lang="da-DK" dirty="0" smtClean="0"/>
+              <a:t>, </a:t>
+            </a:r>
+            <a:r>
+              <a:rPr lang="da-DK" dirty="0" err="1" smtClean="0"/>
+              <a:t>chaining</a:t>
+            </a:r>
+            <a:endParaRPr lang="da-DK" dirty="0" smtClean="0"/>
+          </a:p>
+        </p:txBody>
+      </p:sp>
+      <p:sp>
+        <p:nvSpPr>
+          <p:cNvPr id="33794" name="Pladsholder til indhold 2"/>
+          <p:cNvSpPr>
+            <a:spLocks noGrp="1"/>
+          </p:cNvSpPr>
+          <p:nvPr>
+            <p:ph idx="1"/>
+          </p:nvPr>
+        </p:nvSpPr>
+        <p:spPr/>
+        <p:txBody>
+          <a:bodyPr/>
+          <a:lstStyle/>
+          <a:p>
+            <a:endParaRPr lang="da-DK" smtClean="0"/>
+          </a:p>
+        </p:txBody>
+      </p:sp>
+      <p:pic>
+        <p:nvPicPr>
+          <p:cNvPr id="33795" name="Picture 2"/>
+          <p:cNvPicPr>
+            <a:picLocks noChangeAspect="1" noChangeArrowheads="1"/>
+          </p:cNvPicPr>
+          <p:nvPr/>
+        </p:nvPicPr>
+        <p:blipFill>
+          <a:blip r:embed="rId2"/>
+          <a:srcRect/>
+          <a:stretch>
+            <a:fillRect/>
+          </a:stretch>
+        </p:blipFill>
+        <p:spPr bwMode="auto">
+          <a:xfrm>
+            <a:off x="901483" y="1350151"/>
+            <a:ext cx="6693579" cy="4954328"/>
+          </a:xfrm>
+          <a:prstGeom prst="rect">
+            <a:avLst/>
+          </a:prstGeom>
+          <a:noFill/>
+          <a:ln w="9525">
+            <a:noFill/>
+            <a:miter lim="800000"/>
+            <a:headEnd/>
+            <a:tailEnd/>
+          </a:ln>
+        </p:spPr>
+      </p:pic>
+    </p:spTree>
+    <p:extLst>
+      <p:ext uri="{BB962C8B-B14F-4D97-AF65-F5344CB8AC3E}">
+        <p14:creationId xmlns:p14="http://schemas.microsoft.com/office/powerpoint/2010/main" val="60825302"/>
+      </p:ext>
+    </p:extLst>
+  </p:cSld>
+  <p:clrMapOvr>
+    <a:masterClrMapping/>
+  </p:clrMapOvr>
+  <p:timing>
+    <p:tnLst>
+      <p:par>
+        <p:cTn id="1" dur="indefinite" restart="never" nodeType="tmRoot"/>
+      </p:par>
+    </p:tnLst>
+  </p:timing>
+</p:sld>
+</file>
+
+<file path=ppt/slides/slide5.xml><?xml version="1.0" encoding="utf-8"?>
+<p:sld xmlns:a="http://schemas.openxmlformats.org/drawingml/2006/main" xmlns:r="http://schemas.openxmlformats.org/officeDocument/2006/relationships" xmlns:p="http://schemas.openxmlformats.org/presentationml/2006/main">
+  <p:cSld>
+    <p:spTree>
+      <p:nvGrpSpPr>
+        <p:cNvPr id="1" name=""/>
+        <p:cNvGrpSpPr/>
+        <p:nvPr/>
+      </p:nvGrpSpPr>
+      <p:grpSpPr>
+        <a:xfrm>
+          <a:off x="0" y="0"/>
+          <a:ext cx="0" cy="0"/>
+          <a:chOff x="0" y="0"/>
+          <a:chExt cx="0" cy="0"/>
+        </a:xfrm>
+      </p:grpSpPr>
+      <p:sp>
+        <p:nvSpPr>
+          <p:cNvPr id="34817" name="Titel 1"/>
+          <p:cNvSpPr>
+            <a:spLocks noGrp="1"/>
+          </p:cNvSpPr>
+          <p:nvPr>
+            <p:ph type="title"/>
+          </p:nvPr>
+        </p:nvSpPr>
+        <p:spPr/>
+        <p:txBody>
+          <a:bodyPr/>
+          <a:lstStyle/>
+          <a:p>
+            <a:r>
+              <a:rPr lang="da-DK" dirty="0" err="1" smtClean="0"/>
+              <a:t>Efficiency</a:t>
+            </a:r>
+            <a:r>
+              <a:rPr lang="da-DK" dirty="0" smtClean="0"/>
+              <a:t> and hash </a:t>
+            </a:r>
+            <a:r>
+              <a:rPr lang="da-DK" dirty="0" err="1" smtClean="0"/>
+              <a:t>table</a:t>
+            </a:r>
+            <a:endParaRPr lang="da-DK" dirty="0" smtClean="0"/>
+          </a:p>
+        </p:txBody>
+      </p:sp>
+      <p:sp>
+        <p:nvSpPr>
+          <p:cNvPr id="3" name="Pladsholder til indhold 2"/>
+          <p:cNvSpPr>
+            <a:spLocks noGrp="1"/>
+          </p:cNvSpPr>
+          <p:nvPr>
+            <p:ph idx="1"/>
+          </p:nvPr>
+        </p:nvSpPr>
+        <p:spPr>
+          <a:xfrm>
+            <a:off x="253131" y="1600882"/>
+            <a:ext cx="8889166" cy="4524276"/>
+          </a:xfrm>
+        </p:spPr>
+        <p:txBody>
+          <a:bodyPr rtlCol="0">
+            <a:normAutofit fontScale="62500" lnSpcReduction="20000"/>
+          </a:bodyPr>
+          <a:lstStyle/>
+          <a:p>
+            <a:pPr>
+              <a:buFont typeface="Arial" pitchFamily="34" charset="0"/>
+              <a:buChar char="•"/>
+              <a:defRPr/>
+            </a:pPr>
+            <a:r>
+              <a:rPr lang="da-DK" dirty="0" err="1" smtClean="0"/>
+              <a:t>Insert</a:t>
+            </a:r>
+            <a:r>
+              <a:rPr lang="da-DK" dirty="0" smtClean="0"/>
+              <a:t>, </a:t>
+            </a:r>
+            <a:r>
+              <a:rPr lang="da-DK" dirty="0" err="1" smtClean="0"/>
+              <a:t>delete</a:t>
+            </a:r>
+            <a:r>
+              <a:rPr lang="da-DK" dirty="0" smtClean="0"/>
+              <a:t> and </a:t>
+            </a:r>
+            <a:r>
+              <a:rPr lang="da-DK" dirty="0" err="1" smtClean="0"/>
+              <a:t>search</a:t>
+            </a:r>
+            <a:r>
+              <a:rPr lang="da-DK" dirty="0" smtClean="0"/>
+              <a:t> is (</a:t>
+            </a:r>
+            <a:r>
+              <a:rPr lang="da-DK" dirty="0" err="1" smtClean="0"/>
+              <a:t>nearly</a:t>
+            </a:r>
+            <a:r>
+              <a:rPr lang="da-DK" dirty="0" smtClean="0"/>
+              <a:t>) independent of the </a:t>
+            </a:r>
+            <a:r>
+              <a:rPr lang="da-DK" dirty="0" err="1" smtClean="0"/>
+              <a:t>number</a:t>
+            </a:r>
+            <a:r>
+              <a:rPr lang="da-DK" dirty="0" smtClean="0"/>
+              <a:t> of elements (n)</a:t>
+            </a:r>
+          </a:p>
+          <a:p>
+            <a:pPr lvl="1">
+              <a:buFont typeface="Arial" pitchFamily="34" charset="0"/>
+              <a:buChar char="–"/>
+              <a:defRPr/>
+            </a:pPr>
+            <a:r>
+              <a:rPr lang="da-DK" dirty="0" smtClean="0"/>
+              <a:t> O(1)</a:t>
+            </a:r>
+          </a:p>
+          <a:p>
+            <a:pPr lvl="1">
+              <a:buFont typeface="Arial" pitchFamily="34" charset="0"/>
+              <a:buChar char="–"/>
+              <a:defRPr/>
+            </a:pPr>
+            <a:r>
+              <a:rPr lang="da-DK" dirty="0" smtClean="0"/>
+              <a:t>Load factor</a:t>
+            </a:r>
+          </a:p>
+          <a:p>
+            <a:pPr lvl="1">
+              <a:buFont typeface="Arial" pitchFamily="34" charset="0"/>
+              <a:buChar char="–"/>
+              <a:defRPr/>
+            </a:pPr>
+            <a:endParaRPr lang="da-DK" dirty="0"/>
+          </a:p>
+          <a:p>
+            <a:pPr>
+              <a:buFont typeface="Arial" pitchFamily="34" charset="0"/>
+              <a:buChar char="•"/>
+              <a:defRPr/>
+            </a:pPr>
+            <a:r>
+              <a:rPr lang="da-DK" dirty="0" err="1" smtClean="0"/>
+              <a:t>Table</a:t>
+            </a:r>
+            <a:r>
+              <a:rPr lang="da-DK" dirty="0" smtClean="0"/>
+              <a:t> </a:t>
+            </a:r>
+            <a:r>
+              <a:rPr lang="da-DK" dirty="0" err="1" smtClean="0"/>
+              <a:t>size</a:t>
+            </a:r>
+            <a:r>
+              <a:rPr lang="da-DK" dirty="0" smtClean="0"/>
+              <a:t>  &lt;&lt;  </a:t>
+            </a:r>
+            <a:r>
+              <a:rPr lang="da-DK" dirty="0" err="1" smtClean="0"/>
+              <a:t>number</a:t>
+            </a:r>
+            <a:r>
+              <a:rPr lang="da-DK" dirty="0" smtClean="0"/>
+              <a:t> of </a:t>
+            </a:r>
+            <a:r>
+              <a:rPr lang="da-DK" u="sng" dirty="0" err="1" smtClean="0"/>
+              <a:t>possible</a:t>
+            </a:r>
+            <a:r>
+              <a:rPr lang="da-DK" dirty="0" smtClean="0"/>
+              <a:t> </a:t>
+            </a:r>
+            <a:r>
+              <a:rPr lang="da-DK" dirty="0" err="1" smtClean="0"/>
+              <a:t>different</a:t>
+            </a:r>
+            <a:r>
+              <a:rPr lang="da-DK" dirty="0" smtClean="0"/>
+              <a:t> </a:t>
+            </a:r>
+            <a:r>
+              <a:rPr lang="da-DK" dirty="0" err="1" smtClean="0"/>
+              <a:t>key</a:t>
+            </a:r>
+            <a:r>
+              <a:rPr lang="da-DK" dirty="0" smtClean="0"/>
+              <a:t> </a:t>
+            </a:r>
+            <a:r>
+              <a:rPr lang="da-DK" dirty="0" err="1" smtClean="0"/>
+              <a:t>values</a:t>
+            </a:r>
+            <a:endParaRPr lang="da-DK" dirty="0" smtClean="0"/>
+          </a:p>
+          <a:p>
+            <a:pPr lvl="1">
+              <a:buFont typeface="Arial" pitchFamily="34" charset="0"/>
+              <a:buChar char="–"/>
+              <a:defRPr/>
+            </a:pPr>
+            <a:endParaRPr lang="da-DK" dirty="0"/>
+          </a:p>
+          <a:p>
+            <a:pPr>
+              <a:buFont typeface="Arial" pitchFamily="34" charset="0"/>
+              <a:buChar char="•"/>
+              <a:defRPr/>
+            </a:pPr>
+            <a:r>
+              <a:rPr lang="da-DK" dirty="0" err="1" smtClean="0"/>
+              <a:t>Preferred</a:t>
+            </a:r>
+            <a:r>
+              <a:rPr lang="da-DK" dirty="0" smtClean="0"/>
+              <a:t> </a:t>
+            </a:r>
+            <a:r>
+              <a:rPr lang="da-DK" dirty="0" err="1" smtClean="0"/>
+              <a:t>when</a:t>
+            </a:r>
+            <a:r>
+              <a:rPr lang="da-DK" dirty="0" smtClean="0"/>
+              <a:t> </a:t>
+            </a:r>
+            <a:r>
+              <a:rPr lang="da-DK" dirty="0" err="1" smtClean="0"/>
+              <a:t>you</a:t>
+            </a:r>
+            <a:r>
+              <a:rPr lang="da-DK" dirty="0" smtClean="0"/>
+              <a:t> </a:t>
+            </a:r>
+            <a:r>
+              <a:rPr lang="da-DK" dirty="0" err="1" smtClean="0"/>
+              <a:t>require</a:t>
+            </a:r>
+            <a:r>
+              <a:rPr lang="da-DK" dirty="0" smtClean="0"/>
+              <a:t> fast</a:t>
+            </a:r>
+          </a:p>
+          <a:p>
+            <a:pPr lvl="1">
+              <a:buFont typeface="Arial" pitchFamily="34" charset="0"/>
+              <a:buChar char="–"/>
+              <a:defRPr/>
+            </a:pPr>
+            <a:r>
+              <a:rPr lang="da-DK" dirty="0" err="1" smtClean="0"/>
+              <a:t>search</a:t>
+            </a:r>
+            <a:endParaRPr lang="da-DK" dirty="0" smtClean="0"/>
+          </a:p>
+          <a:p>
+            <a:pPr lvl="1">
+              <a:buFont typeface="Arial" pitchFamily="34" charset="0"/>
+              <a:buChar char="–"/>
+              <a:defRPr/>
+            </a:pPr>
+            <a:r>
+              <a:rPr lang="da-DK" dirty="0" err="1" smtClean="0"/>
+              <a:t>Insert</a:t>
+            </a:r>
+            <a:r>
+              <a:rPr lang="da-DK" dirty="0" smtClean="0"/>
+              <a:t/>
+            </a:r>
+            <a:br>
+              <a:rPr lang="da-DK" dirty="0" smtClean="0"/>
+            </a:br>
+            <a:endParaRPr lang="da-DK" dirty="0" smtClean="0"/>
+          </a:p>
+          <a:p>
+            <a:pPr marL="457050" lvl="1" indent="0">
+              <a:buNone/>
+              <a:defRPr/>
+            </a:pPr>
+            <a:r>
+              <a:rPr lang="da-DK" dirty="0"/>
+              <a:t>b</a:t>
+            </a:r>
+            <a:r>
+              <a:rPr lang="da-DK" dirty="0" smtClean="0"/>
+              <a:t>ut not fast</a:t>
+            </a:r>
+          </a:p>
+          <a:p>
+            <a:pPr lvl="1">
+              <a:buFont typeface="Arial" pitchFamily="34" charset="0"/>
+              <a:buChar char="–"/>
+              <a:defRPr/>
+            </a:pPr>
+            <a:r>
+              <a:rPr lang="da-DK" dirty="0" err="1" smtClean="0"/>
+              <a:t>Iterate</a:t>
+            </a:r>
+            <a:r>
+              <a:rPr lang="da-DK" dirty="0" smtClean="0"/>
+              <a:t> </a:t>
+            </a:r>
+            <a:r>
+              <a:rPr lang="da-DK" dirty="0" err="1" smtClean="0"/>
+              <a:t>sorted</a:t>
+            </a:r>
+            <a:r>
+              <a:rPr lang="da-DK" dirty="0" smtClean="0"/>
+              <a:t> </a:t>
+            </a:r>
+          </a:p>
+          <a:p>
+            <a:pPr lvl="1">
+              <a:buFont typeface="Arial" pitchFamily="34" charset="0"/>
+              <a:buChar char="–"/>
+              <a:defRPr/>
+            </a:pPr>
+            <a:r>
+              <a:rPr lang="da-DK" dirty="0" smtClean="0"/>
+              <a:t>Location of max /min</a:t>
+            </a:r>
+          </a:p>
+          <a:p>
+            <a:pPr marL="0" indent="0">
+              <a:buNone/>
+              <a:defRPr/>
+            </a:pPr>
+            <a:r>
+              <a:rPr lang="da-DK" dirty="0" smtClean="0"/>
+              <a:t> </a:t>
+            </a:r>
+            <a:endParaRPr lang="da-DK" dirty="0"/>
+          </a:p>
+        </p:txBody>
+      </p:sp>
+    </p:spTree>
+    <p:extLst>
+      <p:ext uri="{BB962C8B-B14F-4D97-AF65-F5344CB8AC3E}">
+        <p14:creationId xmlns:p14="http://schemas.microsoft.com/office/powerpoint/2010/main" val="88634742"/>
+      </p:ext>
+    </p:extLst>
+  </p:cSld>
+  <p:clrMapOvr>
+    <a:masterClrMapping/>
+  </p:clrMapOvr>
+  <p:timing>
+    <p:tnLst>
+      <p:par>
+        <p:cTn id="1" dur="indefinite" restart="never" nodeType="tmRoot"/>
+      </p:par>
+    </p:tnLst>
+  </p:timing>
+</p:sld>
+</file>
+
+<file path=ppt/slides/slide6.xml><?xml version="1.0" encoding="utf-8"?>
+<p:sld xmlns:a="http://schemas.openxmlformats.org/drawingml/2006/main" xmlns:r="http://schemas.openxmlformats.org/officeDocument/2006/relationships" xmlns:p="http://schemas.openxmlformats.org/presentationml/2006/main">
+  <p:cSld>
+    <p:spTree>
+      <p:nvGrpSpPr>
+        <p:cNvPr id="1" name=""/>
+        <p:cNvGrpSpPr/>
+        <p:nvPr/>
+      </p:nvGrpSpPr>
+      <p:grpSpPr>
+        <a:xfrm>
+          <a:off x="0" y="0"/>
+          <a:ext cx="0" cy="0"/>
+          <a:chOff x="0" y="0"/>
+          <a:chExt cx="0" cy="0"/>
+        </a:xfrm>
+      </p:grpSpPr>
+      <p:sp>
+        <p:nvSpPr>
           <p:cNvPr id="38913" name="Rectangle 2"/>
           <p:cNvSpPr>
             <a:spLocks noGrp="1" noChangeArrowheads="1"/>
@@ -4395,7 +8823,7 @@
 </p:sld>
 </file>
 
-<file path=ppt/slides/slide2.xml><?xml version="1.0" encoding="utf-8"?>
+<file path=ppt/slides/slide7.xml><?xml version="1.0" encoding="utf-8"?>
 <p:sld xmlns:a="http://schemas.openxmlformats.org/drawingml/2006/main" xmlns:r="http://schemas.openxmlformats.org/officeDocument/2006/relationships" xmlns:p="http://schemas.openxmlformats.org/presentationml/2006/main">
   <p:cSld>
     <p:spTree>
@@ -4536,7 +8964,7 @@
 </p:sld>
 </file>
 
-<file path=ppt/slides/slide3.xml><?xml version="1.0" encoding="utf-8"?>
+<file path=ppt/slides/slide8.xml><?xml version="1.0" encoding="utf-8"?>
 <p:sld xmlns:a="http://schemas.openxmlformats.org/drawingml/2006/main" xmlns:r="http://schemas.openxmlformats.org/officeDocument/2006/relationships" xmlns:p="http://schemas.openxmlformats.org/presentationml/2006/main">
   <p:cSld>
     <p:spTree>
@@ -6555,7 +10983,7 @@
 </p:sld>
 </file>
 
-<file path=ppt/slides/slide4.xml><?xml version="1.0" encoding="utf-8"?>
+<file path=ppt/slides/slide9.xml><?xml version="1.0" encoding="utf-8"?>
 <p:sld xmlns:a="http://schemas.openxmlformats.org/drawingml/2006/main" xmlns:r="http://schemas.openxmlformats.org/officeDocument/2006/relationships" xmlns:p="http://schemas.openxmlformats.org/presentationml/2006/main">
   <p:cSld>
     <p:spTree>

</xml_diff>